<commit_message>
load_csv_files.py added - cleans all csv data to one file. Fatality Analysis Reporting System (FARS) Analytical User’s Manual, 1975-2019.pdf added - has all index tags from csv explained. .pptx file - Added research question regarding more data from the csv file.
</commit_message>
<xml_diff>
--- a/documents/Car Accidents Project.pptx
+++ b/documents/Car Accidents Project.pptx
@@ -120,6 +120,11 @@
       </a:defRPr>
     </a:lvl9pPr>
   </p:defaultTextStyle>
+  <p:extLst>
+    <p:ext uri="{EFAFB233-063F-42B5-8137-9DF3F51BA10A}">
+      <p15:sldGuideLst xmlns:p15="http://schemas.microsoft.com/office/powerpoint/2012/main"/>
+    </p:ext>
+  </p:extLst>
 </p:presentation>
 </file>
 
@@ -309,7 +314,7 @@
           <a:p>
             <a:fld id="{4AAD347D-5ACD-4C99-B74B-A9C85AD731AF}" type="datetimeFigureOut">
               <a:rPr lang="en-US" dirty="0"/>
-              <a:t>5/20/2021</a:t>
+              <a:t>5/22/2021</a:t>
             </a:fld>
             <a:endParaRPr lang="en-US" dirty="0"/>
           </a:p>
@@ -579,7 +584,7 @@
           <a:p>
             <a:fld id="{4509A250-FF31-4206-8172-F9D3106AACB1}" type="datetimeFigureOut">
               <a:rPr lang="en-US" dirty="0"/>
-              <a:t>5/20/2021</a:t>
+              <a:t>5/22/2021</a:t>
             </a:fld>
             <a:endParaRPr lang="en-US" dirty="0"/>
           </a:p>
@@ -768,7 +773,7 @@
           <a:p>
             <a:fld id="{4509A250-FF31-4206-8172-F9D3106AACB1}" type="datetimeFigureOut">
               <a:rPr lang="en-US" dirty="0"/>
-              <a:t>5/20/2021</a:t>
+              <a:t>5/22/2021</a:t>
             </a:fld>
             <a:endParaRPr lang="en-US" dirty="0"/>
           </a:p>
@@ -1036,7 +1041,7 @@
           <a:p>
             <a:fld id="{4509A250-FF31-4206-8172-F9D3106AACB1}" type="datetimeFigureOut">
               <a:rPr lang="en-US" dirty="0"/>
-              <a:t>5/20/2021</a:t>
+              <a:t>5/22/2021</a:t>
             </a:fld>
             <a:endParaRPr lang="en-US" dirty="0"/>
           </a:p>
@@ -1372,7 +1377,7 @@
           <a:p>
             <a:fld id="{4509A250-FF31-4206-8172-F9D3106AACB1}" type="datetimeFigureOut">
               <a:rPr lang="en-US" dirty="0"/>
-              <a:t>5/20/2021</a:t>
+              <a:t>5/22/2021</a:t>
             </a:fld>
             <a:endParaRPr lang="en-US" dirty="0"/>
           </a:p>
@@ -1990,7 +1995,7 @@
           <a:p>
             <a:fld id="{4509A250-FF31-4206-8172-F9D3106AACB1}" type="datetimeFigureOut">
               <a:rPr lang="en-US" dirty="0"/>
-              <a:t>5/20/2021</a:t>
+              <a:t>5/22/2021</a:t>
             </a:fld>
             <a:endParaRPr lang="en-US" dirty="0"/>
           </a:p>
@@ -2845,7 +2850,7 @@
           <a:p>
             <a:fld id="{4509A250-FF31-4206-8172-F9D3106AACB1}" type="datetimeFigureOut">
               <a:rPr lang="en-US" dirty="0"/>
-              <a:t>5/20/2021</a:t>
+              <a:t>5/22/2021</a:t>
             </a:fld>
             <a:endParaRPr lang="en-US" dirty="0"/>
           </a:p>
@@ -3010,7 +3015,7 @@
           <a:p>
             <a:fld id="{4509A250-FF31-4206-8172-F9D3106AACB1}" type="datetimeFigureOut">
               <a:rPr lang="en-US" dirty="0"/>
-              <a:t>5/20/2021</a:t>
+              <a:t>5/22/2021</a:t>
             </a:fld>
             <a:endParaRPr lang="en-US" dirty="0"/>
           </a:p>
@@ -3185,7 +3190,7 @@
           <a:p>
             <a:fld id="{4509A250-FF31-4206-8172-F9D3106AACB1}" type="datetimeFigureOut">
               <a:rPr lang="en-US" dirty="0"/>
-              <a:t>5/20/2021</a:t>
+              <a:t>5/22/2021</a:t>
             </a:fld>
             <a:endParaRPr lang="en-US" dirty="0"/>
           </a:p>
@@ -3350,7 +3355,7 @@
           <a:p>
             <a:fld id="{4509A250-FF31-4206-8172-F9D3106AACB1}" type="datetimeFigureOut">
               <a:rPr lang="en-US" dirty="0"/>
-              <a:t>5/20/2021</a:t>
+              <a:t>5/22/2021</a:t>
             </a:fld>
             <a:endParaRPr lang="en-US" dirty="0"/>
           </a:p>
@@ -3592,7 +3597,7 @@
           <a:p>
             <a:fld id="{9796027F-7875-4030-9381-8BD8C4F21935}" type="datetimeFigureOut">
               <a:rPr lang="en-US" dirty="0"/>
-              <a:t>5/20/2021</a:t>
+              <a:t>5/22/2021</a:t>
             </a:fld>
             <a:endParaRPr lang="en-US" dirty="0"/>
           </a:p>
@@ -3879,7 +3884,7 @@
           <a:p>
             <a:fld id="{9796027F-7875-4030-9381-8BD8C4F21935}" type="datetimeFigureOut">
               <a:rPr lang="en-US" dirty="0"/>
-              <a:t>5/20/2021</a:t>
+              <a:t>5/22/2021</a:t>
             </a:fld>
             <a:endParaRPr lang="en-US" dirty="0"/>
           </a:p>
@@ -4318,7 +4323,7 @@
           <a:p>
             <a:fld id="{9796027F-7875-4030-9381-8BD8C4F21935}" type="datetimeFigureOut">
               <a:rPr lang="en-US" dirty="0"/>
-              <a:t>5/20/2021</a:t>
+              <a:t>5/22/2021</a:t>
             </a:fld>
             <a:endParaRPr lang="en-US" dirty="0"/>
           </a:p>
@@ -4431,7 +4436,7 @@
           <a:p>
             <a:fld id="{4509A250-FF31-4206-8172-F9D3106AACB1}" type="datetimeFigureOut">
               <a:rPr lang="en-US" dirty="0"/>
-              <a:t>5/20/2021</a:t>
+              <a:t>5/22/2021</a:t>
             </a:fld>
             <a:endParaRPr lang="en-US" dirty="0"/>
           </a:p>
@@ -4521,7 +4526,7 @@
           <a:p>
             <a:fld id="{4509A250-FF31-4206-8172-F9D3106AACB1}" type="datetimeFigureOut">
               <a:rPr lang="en-US" dirty="0"/>
-              <a:t>5/20/2021</a:t>
+              <a:t>5/22/2021</a:t>
             </a:fld>
             <a:endParaRPr lang="en-US" dirty="0"/>
           </a:p>
@@ -4795,7 +4800,7 @@
           <a:p>
             <a:fld id="{4509A250-FF31-4206-8172-F9D3106AACB1}" type="datetimeFigureOut">
               <a:rPr lang="en-US" dirty="0"/>
-              <a:t>5/20/2021</a:t>
+              <a:t>5/22/2021</a:t>
             </a:fld>
             <a:endParaRPr lang="en-US" dirty="0"/>
           </a:p>
@@ -5065,7 +5070,7 @@
           <a:p>
             <a:fld id="{4509A250-FF31-4206-8172-F9D3106AACB1}" type="datetimeFigureOut">
               <a:rPr lang="en-US" dirty="0"/>
-              <a:t>5/20/2021</a:t>
+              <a:t>5/22/2021</a:t>
             </a:fld>
             <a:endParaRPr lang="en-US" dirty="0"/>
           </a:p>
@@ -5489,7 +5494,7 @@
           <a:p>
             <a:fld id="{4AAD347D-5ACD-4C99-B74B-A9C85AD731AF}" type="datetimeFigureOut">
               <a:rPr lang="en-US" dirty="0"/>
-              <a:t>5/20/2021</a:t>
+              <a:t>5/22/2021</a:t>
             </a:fld>
             <a:endParaRPr lang="en-US" dirty="0"/>
           </a:p>
@@ -6625,7 +6630,7 @@
         </p:nvSpPr>
         <p:spPr>
           <a:xfrm>
-            <a:off x="1067870" y="3285767"/>
+            <a:off x="1067870" y="2075276"/>
             <a:ext cx="8825658" cy="1382486"/>
           </a:xfrm>
         </p:spPr>
@@ -6642,11 +6647,54 @@
             </a:br>
             <a:r>
               <a:rPr lang="he-IL" dirty="0" smtClean="0"/>
-              <a:t>+ שאלות מחקר</a:t>
+              <a:t>+ שאלות </a:t>
+            </a:r>
+            <a:r>
+              <a:rPr lang="he-IL" dirty="0" smtClean="0"/>
+              <a:t>מחקר</a:t>
             </a:r>
             <a:br>
               <a:rPr lang="he-IL" dirty="0" smtClean="0"/>
             </a:br>
+            <a:endParaRPr lang="he-IL" dirty="0"/>
+          </a:p>
+        </p:txBody>
+      </p:sp>
+      <p:sp>
+        <p:nvSpPr>
+          <p:cNvPr id="3" name="Rectangle 2"/>
+          <p:cNvSpPr/>
+          <p:nvPr/>
+        </p:nvSpPr>
+        <p:spPr>
+          <a:xfrm>
+            <a:off x="695924" y="2581853"/>
+            <a:ext cx="11418510" cy="646331"/>
+          </a:xfrm>
+          <a:prstGeom prst="rect">
+            <a:avLst/>
+          </a:prstGeom>
+        </p:spPr>
+        <p:txBody>
+          <a:bodyPr wrap="none">
+            <a:spAutoFit/>
+          </a:bodyPr>
+          <a:lstStyle/>
+          <a:p>
+            <a:r>
+              <a:rPr lang="en-US" dirty="0" smtClean="0">
+                <a:latin typeface="Arial" panose="020B0604020202020204" pitchFamily="34" charset="0"/>
+              </a:rPr>
+              <a:t>* Is there a connection between the weather and the type of accidents happened (In intersection, what type of </a:t>
+            </a:r>
+          </a:p>
+          <a:p>
+            <a:r>
+              <a:rPr lang="en-US" dirty="0" smtClean="0">
+                <a:latin typeface="Arial" panose="020B0604020202020204" pitchFamily="34" charset="0"/>
+              </a:rPr>
+              <a:t>Objects were harmful in the collision…)</a:t>
+            </a:r>
             <a:endParaRPr lang="he-IL" dirty="0"/>
           </a:p>
         </p:txBody>

</xml_diff>

<commit_message>
Edited and added slides to the presentation.
</commit_message>
<xml_diff>
--- a/documents/Car Accidents Project.pptx
+++ b/documents/Car Accidents Project.pptx
@@ -7,21 +7,22 @@
   <p:sldIdLst>
     <p:sldId id="256" r:id="rId2"/>
     <p:sldId id="258" r:id="rId3"/>
-    <p:sldId id="259" r:id="rId4"/>
-    <p:sldId id="260" r:id="rId5"/>
-    <p:sldId id="261" r:id="rId6"/>
-    <p:sldId id="262" r:id="rId7"/>
-    <p:sldId id="263" r:id="rId8"/>
-    <p:sldId id="264" r:id="rId9"/>
-    <p:sldId id="265" r:id="rId10"/>
-    <p:sldId id="266" r:id="rId11"/>
-    <p:sldId id="267" r:id="rId12"/>
-    <p:sldId id="268" r:id="rId13"/>
-    <p:sldId id="269" r:id="rId14"/>
-    <p:sldId id="270" r:id="rId15"/>
-    <p:sldId id="271" r:id="rId16"/>
-    <p:sldId id="272" r:id="rId17"/>
-    <p:sldId id="273" r:id="rId18"/>
+    <p:sldId id="274" r:id="rId4"/>
+    <p:sldId id="259" r:id="rId5"/>
+    <p:sldId id="260" r:id="rId6"/>
+    <p:sldId id="261" r:id="rId7"/>
+    <p:sldId id="262" r:id="rId8"/>
+    <p:sldId id="263" r:id="rId9"/>
+    <p:sldId id="264" r:id="rId10"/>
+    <p:sldId id="265" r:id="rId11"/>
+    <p:sldId id="266" r:id="rId12"/>
+    <p:sldId id="267" r:id="rId13"/>
+    <p:sldId id="268" r:id="rId14"/>
+    <p:sldId id="269" r:id="rId15"/>
+    <p:sldId id="270" r:id="rId16"/>
+    <p:sldId id="271" r:id="rId17"/>
+    <p:sldId id="272" r:id="rId18"/>
+    <p:sldId id="273" r:id="rId19"/>
   </p:sldIdLst>
   <p:sldSz cx="12192000" cy="6858000"/>
   <p:notesSz cx="6858000" cy="9144000"/>
@@ -6030,8 +6031,8 @@
         </p:nvSpPr>
         <p:spPr>
           <a:xfrm>
-            <a:off x="1067870" y="446314"/>
-            <a:ext cx="8825658" cy="3329581"/>
+            <a:off x="623731" y="951053"/>
+            <a:ext cx="8825658" cy="1190897"/>
           </a:xfrm>
         </p:spPr>
         <p:txBody>
@@ -6039,67 +6040,150 @@
           <a:lstStyle/>
           <a:p>
             <a:r>
+              <a:rPr lang="en-US" sz="9600" dirty="0" smtClean="0"/>
+              <a:t>Car </a:t>
+            </a:r>
+            <a:r>
+              <a:rPr lang="en-US" sz="9600" dirty="0" smtClean="0"/>
+              <a:t>Accidents</a:t>
+            </a:r>
+            <a:endParaRPr lang="he-IL" sz="9600" dirty="0"/>
+          </a:p>
+        </p:txBody>
+      </p:sp>
+      <p:sp>
+        <p:nvSpPr>
+          <p:cNvPr id="3" name="Subtitle 2"/>
+          <p:cNvSpPr>
+            <a:spLocks noGrp="1"/>
+          </p:cNvSpPr>
+          <p:nvPr>
+            <p:ph type="subTitle" idx="1"/>
+          </p:nvPr>
+        </p:nvSpPr>
+        <p:spPr>
+          <a:xfrm>
+            <a:off x="911115" y="2643781"/>
+            <a:ext cx="8825658" cy="861420"/>
+          </a:xfrm>
+        </p:spPr>
+        <p:txBody>
+          <a:bodyPr/>
+          <a:lstStyle/>
+          <a:p>
+            <a:r>
               <a:rPr lang="en-US" dirty="0" smtClean="0"/>
-              <a:t>Car Accidents Project</a:t>
+              <a:t>Lior turgeman 304941412</a:t>
+            </a:r>
+          </a:p>
+          <a:p>
+            <a:r>
+              <a:rPr lang="en-US" dirty="0" smtClean="0"/>
+              <a:t>Dan avERIN 204358394</a:t>
             </a:r>
             <a:endParaRPr lang="he-IL" dirty="0"/>
           </a:p>
         </p:txBody>
       </p:sp>
-      <p:sp>
-        <p:nvSpPr>
-          <p:cNvPr id="3" name="Subtitle 2"/>
-          <p:cNvSpPr>
-            <a:spLocks noGrp="1"/>
-          </p:cNvSpPr>
-          <p:nvPr>
-            <p:ph type="subTitle" idx="1"/>
-          </p:nvPr>
-        </p:nvSpPr>
-        <p:spPr>
-          <a:xfrm>
-            <a:off x="1067870" y="4315826"/>
-            <a:ext cx="8825658" cy="861420"/>
-          </a:xfrm>
-        </p:spPr>
-        <p:txBody>
-          <a:bodyPr/>
-          <a:lstStyle/>
-          <a:p>
-            <a:r>
-              <a:rPr lang="en-US" dirty="0" err="1" smtClean="0"/>
-              <a:t>Lior</a:t>
-            </a:r>
-            <a:r>
-              <a:rPr lang="en-US" dirty="0" smtClean="0"/>
-              <a:t> </a:t>
-            </a:r>
-            <a:r>
-              <a:rPr lang="en-US" dirty="0" err="1" smtClean="0"/>
-              <a:t>turgeman</a:t>
-            </a:r>
-            <a:r>
-              <a:rPr lang="en-US" dirty="0" smtClean="0"/>
-              <a:t> 304941412</a:t>
-            </a:r>
-          </a:p>
-          <a:p>
-            <a:r>
-              <a:rPr lang="en-US" dirty="0" smtClean="0"/>
-              <a:t>Dan </a:t>
-            </a:r>
-            <a:r>
-              <a:rPr lang="en-US" dirty="0" err="1" smtClean="0"/>
-              <a:t>avERIN</a:t>
-            </a:r>
-            <a:r>
-              <a:rPr lang="en-US" dirty="0" smtClean="0"/>
-              <a:t> 204358394</a:t>
-            </a:r>
-            <a:endParaRPr lang="he-IL" dirty="0"/>
-          </a:p>
-        </p:txBody>
-      </p:sp>
+      <p:pic>
+        <p:nvPicPr>
+          <p:cNvPr id="4" name="Picture 3"/>
+          <p:cNvPicPr>
+            <a:picLocks noChangeAspect="1"/>
+          </p:cNvPicPr>
+          <p:nvPr/>
+        </p:nvPicPr>
+        <p:blipFill>
+          <a:blip r:embed="rId2">
+            <a:extLst>
+              <a:ext uri="{28A0092B-C50C-407E-A947-70E740481C1C}">
+                <a14:useLocalDpi xmlns:a14="http://schemas.microsoft.com/office/drawing/2010/main" val="0"/>
+              </a:ext>
+            </a:extLst>
+          </a:blip>
+          <a:stretch>
+            <a:fillRect/>
+          </a:stretch>
+        </p:blipFill>
+        <p:spPr>
+          <a:xfrm rot="20933004">
+            <a:off x="5871870" y="2904960"/>
+            <a:ext cx="5468451" cy="2963817"/>
+          </a:xfrm>
+          <a:prstGeom prst="rect">
+            <a:avLst/>
+          </a:prstGeom>
+          <a:ln w="190500" cap="sq">
+            <a:solidFill>
+              <a:srgbClr val="C8C6BD"/>
+            </a:solidFill>
+            <a:prstDash val="solid"/>
+            <a:miter lim="800000"/>
+          </a:ln>
+          <a:effectLst>
+            <a:outerShdw blurRad="254000" algn="bl" rotWithShape="0">
+              <a:srgbClr val="000000">
+                <a:alpha val="43000"/>
+              </a:srgbClr>
+            </a:outerShdw>
+          </a:effectLst>
+          <a:scene3d>
+            <a:camera prst="perspectiveFront" fov="5400000"/>
+            <a:lightRig rig="threePt" dir="t">
+              <a:rot lat="0" lon="0" rev="2100000"/>
+            </a:lightRig>
+          </a:scene3d>
+          <a:sp3d extrusionH="25400">
+            <a:bevelT w="304800" h="152400" prst="hardEdge"/>
+            <a:extrusionClr>
+              <a:srgbClr val="000000"/>
+            </a:extrusionClr>
+          </a:sp3d>
+        </p:spPr>
+      </p:pic>
+      <p:pic>
+        <p:nvPicPr>
+          <p:cNvPr id="5" name="Picture 4"/>
+          <p:cNvPicPr>
+            <a:picLocks noChangeAspect="1"/>
+          </p:cNvPicPr>
+          <p:nvPr/>
+        </p:nvPicPr>
+        <p:blipFill>
+          <a:blip r:embed="rId3">
+            <a:extLst>
+              <a:ext uri="{28A0092B-C50C-407E-A947-70E740481C1C}">
+                <a14:useLocalDpi xmlns:a14="http://schemas.microsoft.com/office/drawing/2010/main" val="0"/>
+              </a:ext>
+            </a:extLst>
+          </a:blip>
+          <a:stretch>
+            <a:fillRect/>
+          </a:stretch>
+        </p:blipFill>
+        <p:spPr>
+          <a:xfrm>
+            <a:off x="1540328" y="4299856"/>
+            <a:ext cx="3066506" cy="2044337"/>
+          </a:xfrm>
+          <a:prstGeom prst="roundRect">
+            <a:avLst>
+              <a:gd name="adj" fmla="val 8594"/>
+            </a:avLst>
+          </a:prstGeom>
+          <a:solidFill>
+            <a:srgbClr val="FFFFFF">
+              <a:shade val="85000"/>
+            </a:srgbClr>
+          </a:solidFill>
+          <a:ln>
+            <a:noFill/>
+          </a:ln>
+          <a:effectLst>
+            <a:reflection blurRad="12700" stA="38000" endPos="28000" dist="5000" dir="5400000" sy="-100000" algn="bl" rotWithShape="0"/>
+          </a:effectLst>
+        </p:spPr>
+      </p:pic>
     </p:spTree>
     <p:extLst>
       <p:ext uri="{BB962C8B-B14F-4D97-AF65-F5344CB8AC3E}">
@@ -6110,6 +6194,13 @@
   <p:clrMapOvr>
     <a:masterClrMapping/>
   </p:clrMapOvr>
+  <p:timing>
+    <p:tnLst>
+      <p:par>
+        <p:cTn id="1" dur="indefinite" restart="never" nodeType="tmRoot"/>
+      </p:par>
+    </p:tnLst>
+  </p:timing>
 </p:sld>
 </file>
 
@@ -6164,7 +6255,7 @@
     </p:spTree>
     <p:extLst>
       <p:ext uri="{BB962C8B-B14F-4D97-AF65-F5344CB8AC3E}">
-        <p14:creationId xmlns:p14="http://schemas.microsoft.com/office/powerpoint/2010/main" val="3542991779"/>
+        <p14:creationId xmlns:p14="http://schemas.microsoft.com/office/powerpoint/2010/main" val="2999966453"/>
       </p:ext>
     </p:extLst>
   </p:cSld>
@@ -6225,7 +6316,7 @@
     </p:spTree>
     <p:extLst>
       <p:ext uri="{BB962C8B-B14F-4D97-AF65-F5344CB8AC3E}">
-        <p14:creationId xmlns:p14="http://schemas.microsoft.com/office/powerpoint/2010/main" val="2280556467"/>
+        <p14:creationId xmlns:p14="http://schemas.microsoft.com/office/powerpoint/2010/main" val="3542991779"/>
       </p:ext>
     </p:extLst>
   </p:cSld>
@@ -6286,7 +6377,7 @@
     </p:spTree>
     <p:extLst>
       <p:ext uri="{BB962C8B-B14F-4D97-AF65-F5344CB8AC3E}">
-        <p14:creationId xmlns:p14="http://schemas.microsoft.com/office/powerpoint/2010/main" val="1658061808"/>
+        <p14:creationId xmlns:p14="http://schemas.microsoft.com/office/powerpoint/2010/main" val="2280556467"/>
       </p:ext>
     </p:extLst>
   </p:cSld>
@@ -6347,7 +6438,7 @@
     </p:spTree>
     <p:extLst>
       <p:ext uri="{BB962C8B-B14F-4D97-AF65-F5344CB8AC3E}">
-        <p14:creationId xmlns:p14="http://schemas.microsoft.com/office/powerpoint/2010/main" val="295878468"/>
+        <p14:creationId xmlns:p14="http://schemas.microsoft.com/office/powerpoint/2010/main" val="1658061808"/>
       </p:ext>
     </p:extLst>
   </p:cSld>
@@ -6408,7 +6499,7 @@
     </p:spTree>
     <p:extLst>
       <p:ext uri="{BB962C8B-B14F-4D97-AF65-F5344CB8AC3E}">
-        <p14:creationId xmlns:p14="http://schemas.microsoft.com/office/powerpoint/2010/main" val="3041035232"/>
+        <p14:creationId xmlns:p14="http://schemas.microsoft.com/office/powerpoint/2010/main" val="295878468"/>
       </p:ext>
     </p:extLst>
   </p:cSld>
@@ -6469,7 +6560,7 @@
     </p:spTree>
     <p:extLst>
       <p:ext uri="{BB962C8B-B14F-4D97-AF65-F5344CB8AC3E}">
-        <p14:creationId xmlns:p14="http://schemas.microsoft.com/office/powerpoint/2010/main" val="4018868720"/>
+        <p14:creationId xmlns:p14="http://schemas.microsoft.com/office/powerpoint/2010/main" val="3041035232"/>
       </p:ext>
     </p:extLst>
   </p:cSld>
@@ -6530,6 +6621,67 @@
     </p:spTree>
     <p:extLst>
       <p:ext uri="{BB962C8B-B14F-4D97-AF65-F5344CB8AC3E}">
+        <p14:creationId xmlns:p14="http://schemas.microsoft.com/office/powerpoint/2010/main" val="4018868720"/>
+      </p:ext>
+    </p:extLst>
+  </p:cSld>
+  <p:clrMapOvr>
+    <a:masterClrMapping/>
+  </p:clrMapOvr>
+</p:sld>
+</file>
+
+<file path=ppt/slides/slide17.xml><?xml version="1.0" encoding="utf-8"?>
+<p:sld xmlns:a="http://schemas.openxmlformats.org/drawingml/2006/main" xmlns:r="http://schemas.openxmlformats.org/officeDocument/2006/relationships" xmlns:p="http://schemas.openxmlformats.org/presentationml/2006/main">
+  <p:cSld>
+    <p:spTree>
+      <p:nvGrpSpPr>
+        <p:cNvPr id="1" name=""/>
+        <p:cNvGrpSpPr/>
+        <p:nvPr/>
+      </p:nvGrpSpPr>
+      <p:grpSpPr>
+        <a:xfrm>
+          <a:off x="0" y="0"/>
+          <a:ext cx="0" cy="0"/>
+          <a:chOff x="0" y="0"/>
+          <a:chExt cx="0" cy="0"/>
+        </a:xfrm>
+      </p:grpSpPr>
+      <p:sp>
+        <p:nvSpPr>
+          <p:cNvPr id="2" name="Title 1"/>
+          <p:cNvSpPr>
+            <a:spLocks noGrp="1"/>
+          </p:cNvSpPr>
+          <p:nvPr>
+            <p:ph type="ctrTitle"/>
+          </p:nvPr>
+        </p:nvSpPr>
+        <p:spPr>
+          <a:xfrm>
+            <a:off x="1067870" y="446314"/>
+            <a:ext cx="8825658" cy="3329581"/>
+          </a:xfrm>
+        </p:spPr>
+        <p:txBody>
+          <a:bodyPr/>
+          <a:lstStyle/>
+          <a:p>
+            <a:r>
+              <a:rPr lang="en-US" dirty="0" smtClean="0"/>
+              <a:t>TEXT</a:t>
+            </a:r>
+            <a:br>
+              <a:rPr lang="en-US" dirty="0" smtClean="0"/>
+            </a:br>
+            <a:endParaRPr lang="he-IL" dirty="0"/>
+          </a:p>
+        </p:txBody>
+      </p:sp>
+    </p:spTree>
+    <p:extLst>
+      <p:ext uri="{BB962C8B-B14F-4D97-AF65-F5344CB8AC3E}">
         <p14:creationId xmlns:p14="http://schemas.microsoft.com/office/powerpoint/2010/main" val="1378053772"/>
       </p:ext>
     </p:extLst>
@@ -6540,7 +6692,7 @@
 </p:sld>
 </file>
 
-<file path=ppt/slides/slide17.xml><?xml version="1.0" encoding="utf-8"?>
+<file path=ppt/slides/slide18.xml><?xml version="1.0" encoding="utf-8"?>
 <p:sld xmlns:a="http://schemas.openxmlformats.org/drawingml/2006/main" xmlns:r="http://schemas.openxmlformats.org/officeDocument/2006/relationships" xmlns:p="http://schemas.openxmlformats.org/presentationml/2006/main">
   <p:cSld>
     <p:spTree>
@@ -6620,82 +6772,141 @@
       </p:grpSpPr>
       <p:sp>
         <p:nvSpPr>
-          <p:cNvPr id="2" name="Title 1"/>
-          <p:cNvSpPr>
-            <a:spLocks noGrp="1"/>
-          </p:cNvSpPr>
-          <p:nvPr>
-            <p:ph type="ctrTitle"/>
-          </p:nvPr>
-        </p:nvSpPr>
-        <p:spPr>
-          <a:xfrm>
-            <a:off x="1067870" y="2075276"/>
-            <a:ext cx="8825658" cy="1382486"/>
-          </a:xfrm>
-        </p:spPr>
-        <p:txBody>
-          <a:bodyPr/>
-          <a:lstStyle/>
-          <a:p>
-            <a:r>
-              <a:rPr lang="he-IL" dirty="0" smtClean="0"/>
-              <a:t>הסבר כללי על הפרוייקט</a:t>
-            </a:r>
-            <a:br>
-              <a:rPr lang="he-IL" dirty="0" smtClean="0"/>
-            </a:br>
-            <a:r>
-              <a:rPr lang="he-IL" dirty="0" smtClean="0"/>
-              <a:t>+ שאלות </a:t>
-            </a:r>
-            <a:r>
-              <a:rPr lang="he-IL" dirty="0" smtClean="0"/>
-              <a:t>מחקר</a:t>
-            </a:r>
-            <a:br>
-              <a:rPr lang="he-IL" dirty="0" smtClean="0"/>
-            </a:br>
-            <a:endParaRPr lang="he-IL" dirty="0"/>
-          </a:p>
-        </p:txBody>
-      </p:sp>
-      <p:sp>
-        <p:nvSpPr>
           <p:cNvPr id="3" name="Rectangle 2"/>
           <p:cNvSpPr/>
           <p:nvPr/>
         </p:nvSpPr>
         <p:spPr>
           <a:xfrm>
-            <a:off x="695924" y="2581853"/>
-            <a:ext cx="11418510" cy="646331"/>
+            <a:off x="538359" y="1806790"/>
+            <a:ext cx="11139835" cy="2831544"/>
           </a:xfrm>
           <a:prstGeom prst="rect">
             <a:avLst/>
           </a:prstGeom>
         </p:spPr>
         <p:txBody>
-          <a:bodyPr wrap="none">
+          <a:bodyPr wrap="square">
             <a:spAutoFit/>
           </a:bodyPr>
           <a:lstStyle/>
           <a:p>
-            <a:r>
-              <a:rPr lang="en-US" dirty="0" smtClean="0">
+            <a:pPr marL="285750" indent="-285750">
+              <a:buFont typeface="Arial" panose="020B0604020202020204" pitchFamily="34" charset="0"/>
+              <a:buChar char="•"/>
+            </a:pPr>
+            <a:r>
+              <a:rPr lang="en-US" sz="2000" dirty="0" smtClean="0">
                 <a:latin typeface="Arial" panose="020B0604020202020204" pitchFamily="34" charset="0"/>
               </a:rPr>
-              <a:t>* Is there a connection between the weather and the type of accidents happened (In intersection, what type of </a:t>
-            </a:r>
-          </a:p>
-          <a:p>
-            <a:r>
-              <a:rPr lang="en-US" dirty="0" smtClean="0">
+              <a:t>Is there a connection between the amount of car accidents to the weather conditions occurred at the time of the accident?</a:t>
+            </a:r>
+          </a:p>
+          <a:p>
+            <a:pPr marL="285750" indent="-285750">
+              <a:buFont typeface="Arial" panose="020B0604020202020204" pitchFamily="34" charset="0"/>
+              <a:buChar char="•"/>
+            </a:pPr>
+            <a:r>
+              <a:rPr lang="en-US" sz="2000" dirty="0">
                 <a:latin typeface="Arial" panose="020B0604020202020204" pitchFamily="34" charset="0"/>
               </a:rPr>
-              <a:t>Objects were harmful in the collision…)</a:t>
-            </a:r>
-            <a:endParaRPr lang="he-IL" dirty="0"/>
+              <a:t>Is there a connection between the weather and the type of accidents happened (In intersection, what type of </a:t>
+            </a:r>
+            <a:r>
+              <a:rPr lang="en-US" sz="2000" dirty="0" smtClean="0">
+                <a:latin typeface="Arial" panose="020B0604020202020204" pitchFamily="34" charset="0"/>
+              </a:rPr>
+              <a:t>Objects </a:t>
+            </a:r>
+            <a:r>
+              <a:rPr lang="en-US" sz="2000" dirty="0">
+                <a:latin typeface="Arial" panose="020B0604020202020204" pitchFamily="34" charset="0"/>
+              </a:rPr>
+              <a:t>were harmful in the collision</a:t>
+            </a:r>
+            <a:r>
+              <a:rPr lang="en-US" sz="2000" dirty="0" smtClean="0">
+                <a:latin typeface="Arial" panose="020B0604020202020204" pitchFamily="34" charset="0"/>
+              </a:rPr>
+              <a:t>…)</a:t>
+            </a:r>
+          </a:p>
+          <a:p>
+            <a:endParaRPr lang="en-US" sz="2000" dirty="0">
+              <a:latin typeface="Arial" panose="020B0604020202020204" pitchFamily="34" charset="0"/>
+            </a:endParaRPr>
+          </a:p>
+          <a:p>
+            <a:pPr marL="285750" indent="-285750">
+              <a:buFont typeface="Arial" panose="020B0604020202020204" pitchFamily="34" charset="0"/>
+              <a:buChar char="•"/>
+            </a:pPr>
+            <a:r>
+              <a:rPr lang="en-US" sz="2000" dirty="0" smtClean="0">
+                <a:latin typeface="Arial" panose="020B0604020202020204" pitchFamily="34" charset="0"/>
+              </a:rPr>
+              <a:t>Is it possible To predict which accidents will happened according to the road type?</a:t>
+            </a:r>
+          </a:p>
+          <a:p>
+            <a:pPr marL="285750" indent="-285750">
+              <a:buFont typeface="Arial" panose="020B0604020202020204" pitchFamily="34" charset="0"/>
+              <a:buChar char="•"/>
+            </a:pPr>
+            <a:r>
+              <a:rPr lang="en-US" sz="2000" dirty="0" smtClean="0">
+                <a:latin typeface="Arial" panose="020B0604020202020204" pitchFamily="34" charset="0"/>
+              </a:rPr>
+              <a:t>Is there a connection between car accidents and the time/day/night conditions?</a:t>
+            </a:r>
+          </a:p>
+          <a:p>
+            <a:pPr marL="285750" indent="-285750">
+              <a:buFont typeface="Arial" panose="020B0604020202020204" pitchFamily="34" charset="0"/>
+              <a:buChar char="•"/>
+            </a:pPr>
+            <a:r>
+              <a:rPr lang="en-US" sz="2000" dirty="0" smtClean="0">
+                <a:latin typeface="Arial" panose="020B0604020202020204" pitchFamily="34" charset="0"/>
+              </a:rPr>
+              <a:t>Are there states in which more car accidents are likely to occur?</a:t>
+            </a:r>
+          </a:p>
+          <a:p>
+            <a:endParaRPr lang="en-US" dirty="0">
+              <a:latin typeface="Arial" panose="020B0604020202020204" pitchFamily="34" charset="0"/>
+            </a:endParaRPr>
+          </a:p>
+        </p:txBody>
+      </p:sp>
+      <p:sp>
+        <p:nvSpPr>
+          <p:cNvPr id="4" name="TextBox 3"/>
+          <p:cNvSpPr txBox="1"/>
+          <p:nvPr/>
+        </p:nvSpPr>
+        <p:spPr>
+          <a:xfrm>
+            <a:off x="538359" y="531223"/>
+            <a:ext cx="9397124" cy="646331"/>
+          </a:xfrm>
+          <a:prstGeom prst="rect">
+            <a:avLst/>
+          </a:prstGeom>
+          <a:noFill/>
+        </p:spPr>
+        <p:txBody>
+          <a:bodyPr wrap="none" rtlCol="1">
+            <a:spAutoFit/>
+          </a:bodyPr>
+          <a:lstStyle/>
+          <a:p>
+            <a:r>
+              <a:rPr lang="en-US" sz="3600" b="1" dirty="0" smtClean="0"/>
+              <a:t>Project Overview and Research Question</a:t>
+            </a:r>
+            <a:endParaRPr lang="he-IL" sz="3600" b="1" dirty="0"/>
           </a:p>
         </p:txBody>
       </p:sp>
@@ -6709,6 +6920,13 @@
   <p:clrMapOvr>
     <a:masterClrMapping/>
   </p:clrMapOvr>
+  <p:timing>
+    <p:tnLst>
+      <p:par>
+        <p:cTn id="1" dur="indefinite" restart="never" nodeType="tmRoot"/>
+      </p:par>
+    </p:tnLst>
+  </p:timing>
 </p:sld>
 </file>
 
@@ -6731,7 +6949,143 @@
       </p:grpSpPr>
       <p:sp>
         <p:nvSpPr>
-          <p:cNvPr id="2" name="Title 1"/>
+          <p:cNvPr id="3" name="Rectangle 2"/>
+          <p:cNvSpPr/>
+          <p:nvPr/>
+        </p:nvSpPr>
+        <p:spPr>
+          <a:xfrm>
+            <a:off x="538359" y="1806790"/>
+            <a:ext cx="11139835" cy="1477328"/>
+          </a:xfrm>
+          <a:prstGeom prst="rect">
+            <a:avLst/>
+          </a:prstGeom>
+        </p:spPr>
+        <p:txBody>
+          <a:bodyPr wrap="square">
+            <a:spAutoFit/>
+          </a:bodyPr>
+          <a:lstStyle/>
+          <a:p>
+            <a:pPr marL="285750" indent="-285750">
+              <a:buFont typeface="Arial" panose="020B0604020202020204" pitchFamily="34" charset="0"/>
+              <a:buChar char="•"/>
+            </a:pPr>
+            <a:r>
+              <a:rPr lang="en-US" dirty="0" smtClean="0">
+                <a:latin typeface="AriE"/>
+              </a:rPr>
+              <a:t>We chose to use information from </a:t>
+            </a:r>
+            <a:r>
+              <a:rPr lang="en-US" dirty="0">
+                <a:latin typeface="AriE"/>
+              </a:rPr>
+              <a:t>NHTSA(National Highway Traffic Safety </a:t>
+            </a:r>
+            <a:r>
+              <a:rPr lang="en-US" dirty="0" smtClean="0">
+                <a:latin typeface="AriE"/>
+              </a:rPr>
+              <a:t>Administration) - </a:t>
+            </a:r>
+            <a:r>
+              <a:rPr lang="en-US" dirty="0"/>
+              <a:t>agency of the U.S. federal government, part of the Department of </a:t>
+            </a:r>
+            <a:r>
+              <a:rPr lang="en-US" dirty="0" smtClean="0"/>
+              <a:t>Transportation.</a:t>
+            </a:r>
+          </a:p>
+          <a:p>
+            <a:r>
+              <a:rPr lang="en-US" dirty="0" smtClean="0">
+                <a:latin typeface="AriE"/>
+              </a:rPr>
+              <a:t>	</a:t>
+            </a:r>
+            <a:r>
+              <a:rPr lang="en-US" dirty="0" smtClean="0">
+                <a:latin typeface="AriE"/>
+                <a:hlinkClick r:id="rId2"/>
+              </a:rPr>
+              <a:t>https</a:t>
+            </a:r>
+            <a:r>
+              <a:rPr lang="en-US" dirty="0">
+                <a:latin typeface="AriE"/>
+                <a:hlinkClick r:id="rId2"/>
+              </a:rPr>
+              <a:t>://</a:t>
+            </a:r>
+            <a:r>
+              <a:rPr lang="en-US" dirty="0" smtClean="0">
+                <a:latin typeface="AriE"/>
+                <a:hlinkClick r:id="rId2"/>
+              </a:rPr>
+              <a:t>crashviewer.nhtsa.dot.gov/CrashAPI</a:t>
+            </a:r>
+            <a:endParaRPr lang="en-US" dirty="0" smtClean="0">
+              <a:latin typeface="AriE"/>
+            </a:endParaRPr>
+          </a:p>
+          <a:p>
+            <a:endParaRPr lang="en-US" dirty="0" smtClean="0">
+              <a:latin typeface="AriE"/>
+            </a:endParaRPr>
+          </a:p>
+          <a:p>
+            <a:pPr marL="285750" indent="-285750">
+              <a:buFont typeface="Arial" panose="020B0604020202020204" pitchFamily="34" charset="0"/>
+              <a:buChar char="•"/>
+            </a:pPr>
+            <a:r>
+              <a:rPr lang="en-US" dirty="0" smtClean="0">
+                <a:latin typeface="AriE"/>
+              </a:rPr>
+              <a:t>We used the API to retrieve CSV data files from years 2010 up to 2019.</a:t>
+            </a:r>
+            <a:endParaRPr lang="en-US" dirty="0">
+              <a:latin typeface="AriE"/>
+            </a:endParaRPr>
+          </a:p>
+        </p:txBody>
+      </p:sp>
+      <p:sp>
+        <p:nvSpPr>
+          <p:cNvPr id="4" name="TextBox 3"/>
+          <p:cNvSpPr txBox="1"/>
+          <p:nvPr/>
+        </p:nvSpPr>
+        <p:spPr>
+          <a:xfrm>
+            <a:off x="538359" y="531223"/>
+            <a:ext cx="4772460" cy="923330"/>
+          </a:xfrm>
+          <a:prstGeom prst="rect">
+            <a:avLst/>
+          </a:prstGeom>
+          <a:noFill/>
+        </p:spPr>
+        <p:txBody>
+          <a:bodyPr wrap="none" rtlCol="1">
+            <a:spAutoFit/>
+          </a:bodyPr>
+          <a:lstStyle/>
+          <a:p>
+            <a:r>
+              <a:rPr lang="en-US" sz="5400" b="1" dirty="0" smtClean="0"/>
+              <a:t>API &amp; Sources</a:t>
+            </a:r>
+            <a:endParaRPr lang="he-IL" sz="5400" b="1" dirty="0"/>
+          </a:p>
+        </p:txBody>
+      </p:sp>
+      <p:sp>
+        <p:nvSpPr>
+          <p:cNvPr id="5" name="Title 1"/>
           <p:cNvSpPr>
             <a:spLocks noGrp="1"/>
           </p:cNvSpPr>
@@ -6741,53 +7095,61 @@
         </p:nvSpPr>
         <p:spPr>
           <a:xfrm>
-            <a:off x="1003701" y="1713641"/>
-            <a:ext cx="8825658" cy="3329581"/>
+            <a:off x="5974080" y="6983"/>
+            <a:ext cx="3570515" cy="1447570"/>
           </a:xfrm>
         </p:spPr>
         <p:txBody>
           <a:bodyPr/>
           <a:lstStyle/>
           <a:p>
-            <a:r>
-              <a:rPr lang="he-IL" dirty="0" smtClean="0"/>
+            <a:pPr algn="r"/>
+            <a:r>
+              <a:rPr lang="he-IL" sz="1800" dirty="0" smtClean="0"/>
               <a:t>מקורות מידע</a:t>
             </a:r>
             <a:br>
-              <a:rPr lang="he-IL" dirty="0" smtClean="0"/>
+              <a:rPr lang="he-IL" sz="1800" dirty="0" smtClean="0"/>
             </a:br>
             <a:r>
-              <a:rPr lang="en-US" dirty="0" smtClean="0"/>
+              <a:rPr lang="en-US" sz="1800" dirty="0" smtClean="0"/>
               <a:t>API</a:t>
             </a:r>
             <a:br>
-              <a:rPr lang="en-US" dirty="0" smtClean="0"/>
+              <a:rPr lang="en-US" sz="1800" dirty="0" smtClean="0"/>
             </a:br>
             <a:r>
-              <a:rPr lang="he-IL" dirty="0" smtClean="0"/>
+              <a:rPr lang="he-IL" sz="1800" dirty="0" smtClean="0"/>
               <a:t>הרכשה אם עשינו+</a:t>
             </a:r>
             <a:br>
-              <a:rPr lang="he-IL" dirty="0" smtClean="0"/>
+              <a:rPr lang="he-IL" sz="1800" dirty="0" smtClean="0"/>
             </a:br>
             <a:r>
-              <a:rPr lang="he-IL" dirty="0" smtClean="0"/>
+              <a:rPr lang="he-IL" sz="1800" dirty="0" smtClean="0"/>
               <a:t>לינקים\</a:t>
             </a:r>
-            <a:endParaRPr lang="he-IL" dirty="0"/>
+            <a:endParaRPr lang="he-IL" sz="1800" dirty="0"/>
           </a:p>
         </p:txBody>
       </p:sp>
     </p:spTree>
     <p:extLst>
       <p:ext uri="{BB962C8B-B14F-4D97-AF65-F5344CB8AC3E}">
-        <p14:creationId xmlns:p14="http://schemas.microsoft.com/office/powerpoint/2010/main" val="1064329951"/>
+        <p14:creationId xmlns:p14="http://schemas.microsoft.com/office/powerpoint/2010/main" val="6679948"/>
       </p:ext>
     </p:extLst>
   </p:cSld>
   <p:clrMapOvr>
     <a:masterClrMapping/>
   </p:clrMapOvr>
+  <p:timing>
+    <p:tnLst>
+      <p:par>
+        <p:cTn id="1" dur="indefinite" restart="never" nodeType="tmRoot"/>
+      </p:par>
+    </p:tnLst>
+  </p:timing>
 </p:sld>
 </file>
 
@@ -6810,46 +7172,134 @@
       </p:grpSpPr>
       <p:sp>
         <p:nvSpPr>
-          <p:cNvPr id="2" name="Title 1"/>
-          <p:cNvSpPr>
-            <a:spLocks noGrp="1"/>
-          </p:cNvSpPr>
-          <p:nvPr>
-            <p:ph type="ctrTitle"/>
-          </p:nvPr>
-        </p:nvSpPr>
-        <p:spPr>
-          <a:xfrm>
-            <a:off x="1067870" y="446314"/>
-            <a:ext cx="8825658" cy="3329581"/>
-          </a:xfrm>
-        </p:spPr>
-        <p:txBody>
-          <a:bodyPr/>
-          <a:lstStyle/>
-          <a:p>
-            <a:r>
-              <a:rPr lang="he-IL" dirty="0" smtClean="0"/>
-              <a:t>פירוט על שימוש ב</a:t>
-            </a:r>
-            <a:r>
-              <a:rPr lang="en-US" dirty="0" smtClean="0"/>
-              <a:t>API</a:t>
-            </a:r>
-            <a:endParaRPr lang="he-IL" dirty="0"/>
-          </a:p>
-        </p:txBody>
-      </p:sp>
+          <p:cNvPr id="7" name="Rectangle 6"/>
+          <p:cNvSpPr/>
+          <p:nvPr/>
+        </p:nvSpPr>
+        <p:spPr>
+          <a:xfrm>
+            <a:off x="538359" y="1806790"/>
+            <a:ext cx="11139835" cy="1477328"/>
+          </a:xfrm>
+          <a:prstGeom prst="rect">
+            <a:avLst/>
+          </a:prstGeom>
+        </p:spPr>
+        <p:txBody>
+          <a:bodyPr wrap="square">
+            <a:spAutoFit/>
+          </a:bodyPr>
+          <a:lstStyle/>
+          <a:p>
+            <a:r>
+              <a:rPr lang="en-US" dirty="0" smtClean="0">
+                <a:latin typeface="AriE"/>
+              </a:rPr>
+              <a:t>- At out project we used data from the years 2010 up to 2019.</a:t>
+            </a:r>
+          </a:p>
+          <a:p>
+            <a:r>
+              <a:rPr lang="en-US" dirty="0" smtClean="0">
+                <a:latin typeface="AriE"/>
+              </a:rPr>
+              <a:t>- Each year had close to 35,000 records, eventually we got around 290,000 records as result of 10 years of car accidents data from the USA.</a:t>
+            </a:r>
+          </a:p>
+          <a:p>
+            <a:r>
+              <a:rPr lang="en-US" dirty="0" smtClean="0">
+                <a:latin typeface="AriE"/>
+              </a:rPr>
+              <a:t>- We emitted irrelevant data from the original csv files, combined all data to one file which will be used to research the question we presented.</a:t>
+            </a:r>
+            <a:endParaRPr lang="en-US" dirty="0">
+              <a:latin typeface="AriE"/>
+            </a:endParaRPr>
+          </a:p>
+        </p:txBody>
+      </p:sp>
+      <p:sp>
+        <p:nvSpPr>
+          <p:cNvPr id="8" name="TextBox 7"/>
+          <p:cNvSpPr txBox="1"/>
+          <p:nvPr/>
+        </p:nvSpPr>
+        <p:spPr>
+          <a:xfrm>
+            <a:off x="538359" y="531223"/>
+            <a:ext cx="9769021" cy="923330"/>
+          </a:xfrm>
+          <a:prstGeom prst="rect">
+            <a:avLst/>
+          </a:prstGeom>
+          <a:noFill/>
+        </p:spPr>
+        <p:txBody>
+          <a:bodyPr wrap="none" rtlCol="1">
+            <a:spAutoFit/>
+          </a:bodyPr>
+          <a:lstStyle/>
+          <a:p>
+            <a:r>
+              <a:rPr lang="en-US" sz="5400" b="1" dirty="0" smtClean="0"/>
+              <a:t>Data Handling and Cleaning</a:t>
+            </a:r>
+            <a:endParaRPr lang="he-IL" sz="5400" b="1" dirty="0"/>
+          </a:p>
+        </p:txBody>
+      </p:sp>
+      <p:pic>
+        <p:nvPicPr>
+          <p:cNvPr id="11" name="Picture 10"/>
+          <p:cNvPicPr>
+            <a:picLocks noChangeAspect="1"/>
+          </p:cNvPicPr>
+          <p:nvPr/>
+        </p:nvPicPr>
+        <p:blipFill>
+          <a:blip r:embed="rId2"/>
+          <a:stretch>
+            <a:fillRect/>
+          </a:stretch>
+        </p:blipFill>
+        <p:spPr>
+          <a:xfrm>
+            <a:off x="3272887" y="3636355"/>
+            <a:ext cx="5670777" cy="2220195"/>
+          </a:xfrm>
+          <a:prstGeom prst="rect">
+            <a:avLst/>
+          </a:prstGeom>
+          <a:ln>
+            <a:noFill/>
+          </a:ln>
+          <a:effectLst>
+            <a:outerShdw blurRad="190500" algn="tl" rotWithShape="0">
+              <a:srgbClr val="000000">
+                <a:alpha val="70000"/>
+              </a:srgbClr>
+            </a:outerShdw>
+          </a:effectLst>
+        </p:spPr>
+      </p:pic>
     </p:spTree>
     <p:extLst>
       <p:ext uri="{BB962C8B-B14F-4D97-AF65-F5344CB8AC3E}">
-        <p14:creationId xmlns:p14="http://schemas.microsoft.com/office/powerpoint/2010/main" val="3512397050"/>
+        <p14:creationId xmlns:p14="http://schemas.microsoft.com/office/powerpoint/2010/main" val="1064329951"/>
       </p:ext>
     </p:extLst>
   </p:cSld>
   <p:clrMapOvr>
     <a:masterClrMapping/>
   </p:clrMapOvr>
+  <p:timing>
+    <p:tnLst>
+      <p:par>
+        <p:cTn id="1" dur="indefinite" restart="never" nodeType="tmRoot"/>
+      </p:par>
+    </p:tnLst>
+  </p:timing>
 </p:sld>
 </file>
 
@@ -6892,15 +7342,12 @@
           <a:p>
             <a:r>
               <a:rPr lang="he-IL" dirty="0" smtClean="0"/>
-              <a:t>פירוט על הרכשה</a:t>
+              <a:t>פירוט על שימוש ב</a:t>
             </a:r>
             <a:r>
               <a:rPr lang="en-US" dirty="0" smtClean="0"/>
-              <a:t/>
-            </a:r>
-            <a:br>
-              <a:rPr lang="en-US" dirty="0" smtClean="0"/>
-            </a:br>
+              <a:t>API</a:t>
+            </a:r>
             <a:endParaRPr lang="he-IL" dirty="0"/>
           </a:p>
         </p:txBody>
@@ -6908,13 +7355,20 @@
     </p:spTree>
     <p:extLst>
       <p:ext uri="{BB962C8B-B14F-4D97-AF65-F5344CB8AC3E}">
-        <p14:creationId xmlns:p14="http://schemas.microsoft.com/office/powerpoint/2010/main" val="2928312244"/>
+        <p14:creationId xmlns:p14="http://schemas.microsoft.com/office/powerpoint/2010/main" val="3512397050"/>
       </p:ext>
     </p:extLst>
   </p:cSld>
   <p:clrMapOvr>
     <a:masterClrMapping/>
   </p:clrMapOvr>
+  <p:timing>
+    <p:tnLst>
+      <p:par>
+        <p:cTn id="1" dur="indefinite" restart="never" nodeType="tmRoot"/>
+      </p:par>
+    </p:tnLst>
+  </p:timing>
 </p:sld>
 </file>
 
@@ -6947,7 +7401,7 @@
         </p:nvSpPr>
         <p:spPr>
           <a:xfrm>
-            <a:off x="1388712" y="2579914"/>
+            <a:off x="1067870" y="446314"/>
             <a:ext cx="8825658" cy="3329581"/>
           </a:xfrm>
         </p:spPr>
@@ -6956,45 +7410,16 @@
           <a:lstStyle/>
           <a:p>
             <a:r>
+              <a:rPr lang="he-IL" dirty="0" smtClean="0"/>
+              <a:t>פירוט על הרכשה</a:t>
+            </a:r>
+            <a:r>
               <a:rPr lang="en-US" dirty="0" smtClean="0"/>
-              <a:t>EDA – </a:t>
-            </a:r>
-            <a:r>
-              <a:rPr lang="en-US" dirty="0"/>
               <a:t/>
-            </a:r>
-            <a:br>
-              <a:rPr lang="en-US" dirty="0"/>
-            </a:br>
-            <a:r>
-              <a:rPr lang="he-IL" dirty="0" smtClean="0"/>
-              <a:t>הסבר על סינון הנתונים</a:t>
-            </a:r>
-            <a:br>
-              <a:rPr lang="he-IL" dirty="0" smtClean="0"/>
-            </a:br>
-            <a:r>
-              <a:rPr lang="he-IL" dirty="0" smtClean="0"/>
-              <a:t>כמה נתונים לא רלוונטים </a:t>
-            </a:r>
-            <a:br>
-              <a:rPr lang="he-IL" dirty="0" smtClean="0"/>
-            </a:br>
-            <a:r>
-              <a:rPr lang="he-IL" dirty="0" smtClean="0"/>
-              <a:t>שניקנו מה</a:t>
-            </a:r>
-            <a:r>
-              <a:rPr lang="en-US" dirty="0" smtClean="0"/>
-              <a:t>DATA</a:t>
             </a:r>
             <a:br>
               <a:rPr lang="en-US" dirty="0" smtClean="0"/>
             </a:br>
-            <a:r>
-              <a:rPr lang="he-IL" b="1" dirty="0" smtClean="0"/>
-              <a:t>כמה שקופיות</a:t>
-            </a:r>
             <a:endParaRPr lang="he-IL" dirty="0"/>
           </a:p>
         </p:txBody>
@@ -7002,13 +7427,20 @@
     </p:spTree>
     <p:extLst>
       <p:ext uri="{BB962C8B-B14F-4D97-AF65-F5344CB8AC3E}">
-        <p14:creationId xmlns:p14="http://schemas.microsoft.com/office/powerpoint/2010/main" val="2415755760"/>
+        <p14:creationId xmlns:p14="http://schemas.microsoft.com/office/powerpoint/2010/main" val="2928312244"/>
       </p:ext>
     </p:extLst>
   </p:cSld>
   <p:clrMapOvr>
     <a:masterClrMapping/>
   </p:clrMapOvr>
+  <p:timing>
+    <p:tnLst>
+      <p:par>
+        <p:cTn id="1" dur="indefinite" restart="never" nodeType="tmRoot"/>
+      </p:par>
+    </p:tnLst>
+  </p:timing>
 </p:sld>
 </file>
 
@@ -7041,7 +7473,7 @@
         </p:nvSpPr>
         <p:spPr>
           <a:xfrm>
-            <a:off x="1340585" y="2323241"/>
+            <a:off x="1388712" y="2579914"/>
             <a:ext cx="8825658" cy="3329581"/>
           </a:xfrm>
         </p:spPr>
@@ -7050,34 +7482,45 @@
           <a:lstStyle/>
           <a:p>
             <a:r>
+              <a:rPr lang="en-US" dirty="0" smtClean="0"/>
+              <a:t>EDA – </a:t>
+            </a:r>
+            <a:r>
+              <a:rPr lang="en-US" dirty="0"/>
+              <a:t/>
+            </a:r>
+            <a:br>
+              <a:rPr lang="en-US" dirty="0"/>
+            </a:br>
+            <a:r>
               <a:rPr lang="he-IL" dirty="0" smtClean="0"/>
-              <a:t>מסקנות לאחר ניקוי המידע</a:t>
+              <a:t>הסבר על סינון הנתונים</a:t>
             </a:r>
             <a:br>
               <a:rPr lang="he-IL" dirty="0" smtClean="0"/>
             </a:br>
             <a:r>
               <a:rPr lang="he-IL" dirty="0" smtClean="0"/>
-              <a:t>הוצאה של גרפים </a:t>
+              <a:t>כמה נתונים לא רלוונטים </a:t>
+            </a:r>
+            <a:br>
+              <a:rPr lang="he-IL" dirty="0" smtClean="0"/>
+            </a:br>
+            <a:r>
+              <a:rPr lang="he-IL" dirty="0" smtClean="0"/>
+              <a:t>שניקנו מה</a:t>
             </a:r>
             <a:r>
               <a:rPr lang="en-US" dirty="0" smtClean="0"/>
-              <a:t>– </a:t>
+              <a:t>DATA</a:t>
             </a:r>
             <a:br>
               <a:rPr lang="en-US" dirty="0" smtClean="0"/>
             </a:br>
             <a:r>
-              <a:rPr lang="he-IL" dirty="0" smtClean="0"/>
-              <a:t>מסקנות </a:t>
-            </a:r>
-            <a:r>
-              <a:rPr lang="en-US" dirty="0" smtClean="0"/>
-              <a:t/>
-            </a:r>
-            <a:br>
-              <a:rPr lang="en-US" dirty="0" smtClean="0"/>
-            </a:br>
+              <a:rPr lang="he-IL" b="1" dirty="0" smtClean="0"/>
+              <a:t>כמה שקופיות</a:t>
+            </a:r>
             <a:endParaRPr lang="he-IL" dirty="0"/>
           </a:p>
         </p:txBody>
@@ -7085,13 +7528,20 @@
     </p:spTree>
     <p:extLst>
       <p:ext uri="{BB962C8B-B14F-4D97-AF65-F5344CB8AC3E}">
-        <p14:creationId xmlns:p14="http://schemas.microsoft.com/office/powerpoint/2010/main" val="2883604918"/>
+        <p14:creationId xmlns:p14="http://schemas.microsoft.com/office/powerpoint/2010/main" val="2415755760"/>
       </p:ext>
     </p:extLst>
   </p:cSld>
   <p:clrMapOvr>
     <a:masterClrMapping/>
   </p:clrMapOvr>
+  <p:timing>
+    <p:tnLst>
+      <p:par>
+        <p:cTn id="1" dur="indefinite" restart="never" nodeType="tmRoot"/>
+      </p:par>
+    </p:tnLst>
+  </p:timing>
 </p:sld>
 </file>
 
@@ -7124,7 +7574,7 @@
         </p:nvSpPr>
         <p:spPr>
           <a:xfrm>
-            <a:off x="1164123" y="911535"/>
+            <a:off x="1340585" y="2323241"/>
             <a:ext cx="8825658" cy="3329581"/>
           </a:xfrm>
         </p:spPr>
@@ -7134,22 +7584,33 @@
           <a:p>
             <a:r>
               <a:rPr lang="he-IL" dirty="0" smtClean="0"/>
-              <a:t>למידת מכונה</a:t>
+              <a:t>מסקנות לאחר ניקוי המידע</a:t>
             </a:r>
             <a:br>
               <a:rPr lang="he-IL" dirty="0" smtClean="0"/>
             </a:br>
             <a:r>
               <a:rPr lang="he-IL" dirty="0" smtClean="0"/>
+              <a:t>הוצאה של גרפים </a:t>
+            </a:r>
+            <a:r>
+              <a:rPr lang="en-US" dirty="0" smtClean="0"/>
+              <a:t>– </a:t>
+            </a:r>
+            <a:br>
+              <a:rPr lang="en-US" dirty="0" smtClean="0"/>
+            </a:br>
+            <a:r>
+              <a:rPr lang="he-IL" dirty="0" smtClean="0"/>
               <a:t>מסקנות </a:t>
             </a:r>
+            <a:r>
+              <a:rPr lang="en-US" dirty="0" smtClean="0"/>
+              <a:t/>
+            </a:r>
             <a:br>
-              <a:rPr lang="he-IL" dirty="0" smtClean="0"/>
+              <a:rPr lang="en-US" dirty="0" smtClean="0"/>
             </a:br>
-            <a:r>
-              <a:rPr lang="he-IL" dirty="0" smtClean="0"/>
-              <a:t>ואיך לבצע</a:t>
-            </a:r>
             <a:endParaRPr lang="he-IL" dirty="0"/>
           </a:p>
         </p:txBody>
@@ -7157,7 +7618,7 @@
     </p:spTree>
     <p:extLst>
       <p:ext uri="{BB962C8B-B14F-4D97-AF65-F5344CB8AC3E}">
-        <p14:creationId xmlns:p14="http://schemas.microsoft.com/office/powerpoint/2010/main" val="1447393666"/>
+        <p14:creationId xmlns:p14="http://schemas.microsoft.com/office/powerpoint/2010/main" val="2883604918"/>
       </p:ext>
     </p:extLst>
   </p:cSld>
@@ -7196,7 +7657,7 @@
         </p:nvSpPr>
         <p:spPr>
           <a:xfrm>
-            <a:off x="1067870" y="446314"/>
+            <a:off x="1164123" y="911535"/>
             <a:ext cx="8825658" cy="3329581"/>
           </a:xfrm>
         </p:spPr>
@@ -7205,12 +7666,23 @@
           <a:lstStyle/>
           <a:p>
             <a:r>
-              <a:rPr lang="en-US" dirty="0" smtClean="0"/>
-              <a:t>TEXT</a:t>
+              <a:rPr lang="he-IL" dirty="0" smtClean="0"/>
+              <a:t>למידת מכונה</a:t>
             </a:r>
             <a:br>
-              <a:rPr lang="en-US" dirty="0" smtClean="0"/>
+              <a:rPr lang="he-IL" dirty="0" smtClean="0"/>
             </a:br>
+            <a:r>
+              <a:rPr lang="he-IL" dirty="0" smtClean="0"/>
+              <a:t>מסקנות </a:t>
+            </a:r>
+            <a:br>
+              <a:rPr lang="he-IL" dirty="0" smtClean="0"/>
+            </a:br>
+            <a:r>
+              <a:rPr lang="he-IL" dirty="0" smtClean="0"/>
+              <a:t>ואיך לבצע</a:t>
+            </a:r>
             <a:endParaRPr lang="he-IL" dirty="0"/>
           </a:p>
         </p:txBody>
@@ -7218,7 +7690,7 @@
     </p:spTree>
     <p:extLst>
       <p:ext uri="{BB962C8B-B14F-4D97-AF65-F5344CB8AC3E}">
-        <p14:creationId xmlns:p14="http://schemas.microsoft.com/office/powerpoint/2010/main" val="2999966453"/>
+        <p14:creationId xmlns:p14="http://schemas.microsoft.com/office/powerpoint/2010/main" val="1447393666"/>
       </p:ext>
     </p:extLst>
   </p:cSld>

</xml_diff>

<commit_message>
Update git with all relevant data.
</commit_message>
<xml_diff>
--- a/documents/Car Accidents Project.pptx
+++ b/documents/Car Accidents Project.pptx
@@ -315,7 +315,7 @@
           <a:p>
             <a:fld id="{4AAD347D-5ACD-4C99-B74B-A9C85AD731AF}" type="datetimeFigureOut">
               <a:rPr lang="en-US" dirty="0"/>
-              <a:t>6/17/2021</a:t>
+              <a:t>6/19/2021</a:t>
             </a:fld>
             <a:endParaRPr lang="en-US" dirty="0"/>
           </a:p>
@@ -585,7 +585,7 @@
           <a:p>
             <a:fld id="{4509A250-FF31-4206-8172-F9D3106AACB1}" type="datetimeFigureOut">
               <a:rPr lang="en-US" dirty="0"/>
-              <a:t>6/17/2021</a:t>
+              <a:t>6/19/2021</a:t>
             </a:fld>
             <a:endParaRPr lang="en-US" dirty="0"/>
           </a:p>
@@ -774,7 +774,7 @@
           <a:p>
             <a:fld id="{4509A250-FF31-4206-8172-F9D3106AACB1}" type="datetimeFigureOut">
               <a:rPr lang="en-US" dirty="0"/>
-              <a:t>6/17/2021</a:t>
+              <a:t>6/19/2021</a:t>
             </a:fld>
             <a:endParaRPr lang="en-US" dirty="0"/>
           </a:p>
@@ -1042,7 +1042,7 @@
           <a:p>
             <a:fld id="{4509A250-FF31-4206-8172-F9D3106AACB1}" type="datetimeFigureOut">
               <a:rPr lang="en-US" dirty="0"/>
-              <a:t>6/17/2021</a:t>
+              <a:t>6/19/2021</a:t>
             </a:fld>
             <a:endParaRPr lang="en-US" dirty="0"/>
           </a:p>
@@ -1378,7 +1378,7 @@
           <a:p>
             <a:fld id="{4509A250-FF31-4206-8172-F9D3106AACB1}" type="datetimeFigureOut">
               <a:rPr lang="en-US" dirty="0"/>
-              <a:t>6/17/2021</a:t>
+              <a:t>6/19/2021</a:t>
             </a:fld>
             <a:endParaRPr lang="en-US" dirty="0"/>
           </a:p>
@@ -1996,7 +1996,7 @@
           <a:p>
             <a:fld id="{4509A250-FF31-4206-8172-F9D3106AACB1}" type="datetimeFigureOut">
               <a:rPr lang="en-US" dirty="0"/>
-              <a:t>6/17/2021</a:t>
+              <a:t>6/19/2021</a:t>
             </a:fld>
             <a:endParaRPr lang="en-US" dirty="0"/>
           </a:p>
@@ -2851,7 +2851,7 @@
           <a:p>
             <a:fld id="{4509A250-FF31-4206-8172-F9D3106AACB1}" type="datetimeFigureOut">
               <a:rPr lang="en-US" dirty="0"/>
-              <a:t>6/17/2021</a:t>
+              <a:t>6/19/2021</a:t>
             </a:fld>
             <a:endParaRPr lang="en-US" dirty="0"/>
           </a:p>
@@ -3016,7 +3016,7 @@
           <a:p>
             <a:fld id="{4509A250-FF31-4206-8172-F9D3106AACB1}" type="datetimeFigureOut">
               <a:rPr lang="en-US" dirty="0"/>
-              <a:t>6/17/2021</a:t>
+              <a:t>6/19/2021</a:t>
             </a:fld>
             <a:endParaRPr lang="en-US" dirty="0"/>
           </a:p>
@@ -3191,7 +3191,7 @@
           <a:p>
             <a:fld id="{4509A250-FF31-4206-8172-F9D3106AACB1}" type="datetimeFigureOut">
               <a:rPr lang="en-US" dirty="0"/>
-              <a:t>6/17/2021</a:t>
+              <a:t>6/19/2021</a:t>
             </a:fld>
             <a:endParaRPr lang="en-US" dirty="0"/>
           </a:p>
@@ -3356,7 +3356,7 @@
           <a:p>
             <a:fld id="{4509A250-FF31-4206-8172-F9D3106AACB1}" type="datetimeFigureOut">
               <a:rPr lang="en-US" dirty="0"/>
-              <a:t>6/17/2021</a:t>
+              <a:t>6/19/2021</a:t>
             </a:fld>
             <a:endParaRPr lang="en-US" dirty="0"/>
           </a:p>
@@ -3598,7 +3598,7 @@
           <a:p>
             <a:fld id="{9796027F-7875-4030-9381-8BD8C4F21935}" type="datetimeFigureOut">
               <a:rPr lang="en-US" dirty="0"/>
-              <a:t>6/17/2021</a:t>
+              <a:t>6/19/2021</a:t>
             </a:fld>
             <a:endParaRPr lang="en-US" dirty="0"/>
           </a:p>
@@ -3885,7 +3885,7 @@
           <a:p>
             <a:fld id="{9796027F-7875-4030-9381-8BD8C4F21935}" type="datetimeFigureOut">
               <a:rPr lang="en-US" dirty="0"/>
-              <a:t>6/17/2021</a:t>
+              <a:t>6/19/2021</a:t>
             </a:fld>
             <a:endParaRPr lang="en-US" dirty="0"/>
           </a:p>
@@ -4324,7 +4324,7 @@
           <a:p>
             <a:fld id="{9796027F-7875-4030-9381-8BD8C4F21935}" type="datetimeFigureOut">
               <a:rPr lang="en-US" dirty="0"/>
-              <a:t>6/17/2021</a:t>
+              <a:t>6/19/2021</a:t>
             </a:fld>
             <a:endParaRPr lang="en-US" dirty="0"/>
           </a:p>
@@ -4437,7 +4437,7 @@
           <a:p>
             <a:fld id="{4509A250-FF31-4206-8172-F9D3106AACB1}" type="datetimeFigureOut">
               <a:rPr lang="en-US" dirty="0"/>
-              <a:t>6/17/2021</a:t>
+              <a:t>6/19/2021</a:t>
             </a:fld>
             <a:endParaRPr lang="en-US" dirty="0"/>
           </a:p>
@@ -4527,7 +4527,7 @@
           <a:p>
             <a:fld id="{4509A250-FF31-4206-8172-F9D3106AACB1}" type="datetimeFigureOut">
               <a:rPr lang="en-US" dirty="0"/>
-              <a:t>6/17/2021</a:t>
+              <a:t>6/19/2021</a:t>
             </a:fld>
             <a:endParaRPr lang="en-US" dirty="0"/>
           </a:p>
@@ -4801,7 +4801,7 @@
           <a:p>
             <a:fld id="{4509A250-FF31-4206-8172-F9D3106AACB1}" type="datetimeFigureOut">
               <a:rPr lang="en-US" dirty="0"/>
-              <a:t>6/17/2021</a:t>
+              <a:t>6/19/2021</a:t>
             </a:fld>
             <a:endParaRPr lang="en-US" dirty="0"/>
           </a:p>
@@ -5071,7 +5071,7 @@
           <a:p>
             <a:fld id="{4509A250-FF31-4206-8172-F9D3106AACB1}" type="datetimeFigureOut">
               <a:rPr lang="en-US" dirty="0"/>
-              <a:t>6/17/2021</a:t>
+              <a:t>6/19/2021</a:t>
             </a:fld>
             <a:endParaRPr lang="en-US" dirty="0"/>
           </a:p>
@@ -5495,7 +5495,7 @@
           <a:p>
             <a:fld id="{4AAD347D-5ACD-4C99-B74B-A9C85AD731AF}" type="datetimeFigureOut">
               <a:rPr lang="en-US" dirty="0"/>
-              <a:t>6/17/2021</a:t>
+              <a:t>6/19/2021</a:t>
             </a:fld>
             <a:endParaRPr lang="en-US" dirty="0"/>
           </a:p>
@@ -7213,6 +7213,13 @@
   <p:clrMapOvr>
     <a:masterClrMapping/>
   </p:clrMapOvr>
+  <p:timing>
+    <p:tnLst>
+      <p:par>
+        <p:cTn id="1" dur="indefinite" restart="never" nodeType="tmRoot"/>
+      </p:par>
+    </p:tnLst>
+  </p:timing>
 </p:sld>
 </file>
 
@@ -7284,7 +7291,7 @@
         <p:spPr>
           <a:xfrm>
             <a:off x="538359" y="1744317"/>
-            <a:ext cx="11139835" cy="1477328"/>
+            <a:ext cx="11139835" cy="2862322"/>
           </a:xfrm>
           <a:prstGeom prst="rect">
             <a:avLst/>
@@ -7329,7 +7336,25 @@
               <a:rPr lang="en-US" dirty="0">
                 <a:latin typeface="AriE"/>
               </a:rPr>
-              <a:t>We choose to ask the most details information, so we needed to send 10 request, 1 per years, than we combined the entire Data to 1 Big csv files.</a:t>
+              <a:t>There</a:t>
+            </a:r>
+            <a:r>
+              <a:rPr lang="en-US" dirty="0">
+                <a:latin typeface="AriE"/>
+              </a:rPr>
+              <a:t> is a lot of API options, and we chose to Get </a:t>
+            </a:r>
+            <a:r>
+              <a:rPr lang="en-US" dirty="0">
+                <a:latin typeface="AriE"/>
+              </a:rPr>
+              <a:t>FARS Data By </a:t>
+            </a:r>
+            <a:r>
+              <a:rPr lang="en-US" dirty="0">
+                <a:latin typeface="AriE"/>
+              </a:rPr>
+              <a:t>Year with the richest variety of information. </a:t>
             </a:r>
           </a:p>
           <a:p>
@@ -7338,11 +7363,84 @@
               <a:buChar char="-"/>
             </a:pPr>
             <a:r>
+              <a:rPr lang="en-US" dirty="0" smtClean="0">
+                <a:latin typeface="AriE"/>
+              </a:rPr>
+              <a:t>The data pulled using the following API requests:</a:t>
+            </a:r>
+          </a:p>
+          <a:p>
+            <a:pPr marL="285750" indent="-285750">
+              <a:buFontTx/>
+              <a:buChar char="-"/>
+            </a:pPr>
+            <a:r>
               <a:rPr lang="en-US" dirty="0">
                 <a:latin typeface="AriE"/>
               </a:rPr>
-              <a:t>While we check out Data we clear not Relevant Data to our project.</a:t>
-            </a:r>
+              <a:t>https://</a:t>
+            </a:r>
+            <a:r>
+              <a:rPr lang="en-US" dirty="0" smtClean="0">
+                <a:latin typeface="AriE"/>
+              </a:rPr>
+              <a:t>crashviewer.nhtsa.dot.gov/CrashAPI/FARSData/GetFARSData?dataset=Accident&amp;caseYear=</a:t>
+            </a:r>
+            <a:r>
+              <a:rPr lang="en-US" dirty="0" smtClean="0">
+                <a:solidFill>
+                  <a:srgbClr val="FF0000"/>
+                </a:solidFill>
+                <a:latin typeface="AriE"/>
+              </a:rPr>
+              <a:t>X</a:t>
+            </a:r>
+            <a:r>
+              <a:rPr lang="en-US" dirty="0" smtClean="0">
+                <a:latin typeface="AriE"/>
+              </a:rPr>
+              <a:t>&amp;format=csv</a:t>
+            </a:r>
+          </a:p>
+          <a:p>
+            <a:r>
+              <a:rPr lang="en-US" dirty="0" smtClean="0">
+                <a:solidFill>
+                  <a:srgbClr val="FF0000"/>
+                </a:solidFill>
+                <a:latin typeface="AriE"/>
+              </a:rPr>
+              <a:t>	X</a:t>
+            </a:r>
+            <a:r>
+              <a:rPr lang="en-US" dirty="0" smtClean="0">
+                <a:latin typeface="AriE"/>
+              </a:rPr>
+              <a:t> – represents every year from 2010 up to 2019</a:t>
+            </a:r>
+          </a:p>
+          <a:p>
+            <a:pPr marL="285750" indent="-285750">
+              <a:buFontTx/>
+              <a:buChar char="-"/>
+            </a:pPr>
+            <a:r>
+              <a:rPr lang="en-US" dirty="0" smtClean="0">
+                <a:latin typeface="AriE"/>
+              </a:rPr>
+              <a:t>We combined and created new big CSV File with all the data that contains</a:t>
+            </a:r>
+          </a:p>
+          <a:p>
+            <a:r>
+              <a:rPr lang="en-US" dirty="0" smtClean="0">
+                <a:latin typeface="AriE"/>
+              </a:rPr>
+              <a:t>323,480 rows of data.</a:t>
+            </a:r>
+            <a:endParaRPr lang="en-US" dirty="0">
+              <a:latin typeface="AriE"/>
+            </a:endParaRPr>
           </a:p>
           <a:p>
             <a:r>
@@ -7354,43 +7452,30 @@
           </a:p>
         </p:txBody>
       </p:sp>
-      <p:sp>
-        <p:nvSpPr>
-          <p:cNvPr id="7" name="תיבת טקסט 6">
-            <a:extLst>
-              <a:ext uri="{FF2B5EF4-FFF2-40B4-BE49-F238E27FC236}">
-                <a16:creationId xmlns:a16="http://schemas.microsoft.com/office/drawing/2014/main" id="{F224C36E-CA4F-4D47-B5E9-36183DCD3D39}"/>
-              </a:ext>
-            </a:extLst>
-          </p:cNvPr>
-          <p:cNvSpPr txBox="1"/>
+      <p:pic>
+        <p:nvPicPr>
+          <p:cNvPr id="8" name="Picture 7"/>
+          <p:cNvPicPr>
+            <a:picLocks noChangeAspect="1"/>
+          </p:cNvPicPr>
           <p:nvPr/>
-        </p:nvSpPr>
-        <p:spPr>
-          <a:xfrm>
-            <a:off x="2990335" y="3682314"/>
-            <a:ext cx="4188941" cy="646331"/>
+        </p:nvPicPr>
+        <p:blipFill>
+          <a:blip r:embed="rId3"/>
+          <a:stretch>
+            <a:fillRect/>
+          </a:stretch>
+        </p:blipFill>
+        <p:spPr>
+          <a:xfrm>
+            <a:off x="8700679" y="3468324"/>
+            <a:ext cx="2419350" cy="2638425"/>
           </a:xfrm>
           <a:prstGeom prst="rect">
             <a:avLst/>
           </a:prstGeom>
-          <a:noFill/>
-        </p:spPr>
-        <p:txBody>
-          <a:bodyPr wrap="square" rtlCol="0">
-            <a:spAutoFit/>
-          </a:bodyPr>
-          <a:lstStyle/>
-          <a:p>
-            <a:pPr algn="ctr"/>
-            <a:r>
-              <a:rPr lang="he-IL" dirty="0"/>
-              <a:t>להוסיף תמונה של כל העמודות הלא רלוונטיות שניקינו מהעבודה</a:t>
-            </a:r>
-            <a:endParaRPr lang="en-IL" dirty="0"/>
-          </a:p>
-        </p:txBody>
-      </p:sp>
+        </p:spPr>
+      </p:pic>
     </p:spTree>
     <p:extLst>
       <p:ext uri="{BB962C8B-B14F-4D97-AF65-F5344CB8AC3E}">
@@ -7401,6 +7486,21 @@
   <p:clrMapOvr>
     <a:masterClrMapping/>
   </p:clrMapOvr>
+  <mc:AlternateContent xmlns:mc="http://schemas.openxmlformats.org/markup-compatibility/2006">
+    <mc:Choice xmlns:p14="http://schemas.microsoft.com/office/powerpoint/2010/main" Requires="p14">
+      <p:transition spd="slow" p14:dur="2000"/>
+    </mc:Choice>
+    <mc:Fallback>
+      <p:transition spd="slow"/>
+    </mc:Fallback>
+  </mc:AlternateContent>
+  <p:timing>
+    <p:tnLst>
+      <p:par>
+        <p:cTn id="1" dur="indefinite" restart="never" nodeType="tmRoot"/>
+      </p:par>
+    </p:tnLst>
+  </p:timing>
 </p:sld>
 </file>
 
@@ -7423,35 +7523,183 @@
       </p:grpSpPr>
       <p:sp>
         <p:nvSpPr>
-          <p:cNvPr id="2" name="Title 1"/>
-          <p:cNvSpPr>
-            <a:spLocks noGrp="1"/>
-          </p:cNvSpPr>
-          <p:nvPr>
-            <p:ph type="ctrTitle"/>
-          </p:nvPr>
-        </p:nvSpPr>
-        <p:spPr>
-          <a:xfrm>
-            <a:off x="1067870" y="446314"/>
-            <a:ext cx="8825658" cy="3329581"/>
-          </a:xfrm>
-        </p:spPr>
-        <p:txBody>
-          <a:bodyPr/>
+          <p:cNvPr id="3" name="TextBox 7">
+            <a:extLst>
+              <a:ext uri="{FF2B5EF4-FFF2-40B4-BE49-F238E27FC236}">
+                <a16:creationId xmlns:a16="http://schemas.microsoft.com/office/drawing/2014/main" id="{8F71F704-828A-44E9-90AF-992932E7DA99}"/>
+              </a:ext>
+            </a:extLst>
+          </p:cNvPr>
+          <p:cNvSpPr txBox="1"/>
+          <p:nvPr/>
+        </p:nvSpPr>
+        <p:spPr>
+          <a:xfrm>
+            <a:off x="538359" y="539785"/>
+            <a:ext cx="1736373" cy="923330"/>
+          </a:xfrm>
+          <a:prstGeom prst="rect">
+            <a:avLst/>
+          </a:prstGeom>
+          <a:noFill/>
+        </p:spPr>
+        <p:txBody>
+          <a:bodyPr wrap="none" rtlCol="1">
+            <a:spAutoFit/>
+          </a:bodyPr>
           <a:lstStyle/>
           <a:p>
             <a:r>
-              <a:rPr lang="he-IL" dirty="0"/>
-              <a:t>פירוט על הרכשה</a:t>
-            </a:r>
-            <a:br>
-              <a:rPr lang="en-US" dirty="0"/>
-            </a:br>
-            <a:endParaRPr lang="he-IL" dirty="0"/>
-          </a:p>
-        </p:txBody>
-      </p:sp>
+              <a:rPr lang="en-US" sz="5400" b="1" dirty="0" smtClean="0"/>
+              <a:t>EDA </a:t>
+            </a:r>
+            <a:endParaRPr lang="he-IL" sz="5400" b="1" dirty="0"/>
+          </a:p>
+        </p:txBody>
+      </p:sp>
+      <p:sp>
+        <p:nvSpPr>
+          <p:cNvPr id="5" name="Rectangle 6">
+            <a:extLst>
+              <a:ext uri="{FF2B5EF4-FFF2-40B4-BE49-F238E27FC236}">
+                <a16:creationId xmlns:a16="http://schemas.microsoft.com/office/drawing/2014/main" id="{F461E7A1-CAC8-480F-A3D5-F9781A7163B1}"/>
+              </a:ext>
+            </a:extLst>
+          </p:cNvPr>
+          <p:cNvSpPr/>
+          <p:nvPr/>
+        </p:nvSpPr>
+        <p:spPr>
+          <a:xfrm>
+            <a:off x="538359" y="1602586"/>
+            <a:ext cx="11174670" cy="2031325"/>
+          </a:xfrm>
+          <a:prstGeom prst="rect">
+            <a:avLst/>
+          </a:prstGeom>
+        </p:spPr>
+        <p:txBody>
+          <a:bodyPr wrap="square">
+            <a:spAutoFit/>
+          </a:bodyPr>
+          <a:lstStyle/>
+          <a:p>
+            <a:pPr marL="285750" indent="-285750">
+              <a:buFontTx/>
+              <a:buChar char="-"/>
+            </a:pPr>
+            <a:r>
+              <a:rPr lang="en-US" dirty="0">
+                <a:latin typeface="AriE"/>
+              </a:rPr>
+              <a:t> While we check our Data we cleared not Relevant Data to our research questions</a:t>
+            </a:r>
+            <a:r>
+              <a:rPr lang="en-US" dirty="0" smtClean="0">
+                <a:latin typeface="AriE"/>
+              </a:rPr>
+              <a:t>.</a:t>
+            </a:r>
+          </a:p>
+          <a:p>
+            <a:pPr marL="285750" indent="-285750">
+              <a:buFontTx/>
+              <a:buChar char="-"/>
+            </a:pPr>
+            <a:r>
+              <a:rPr lang="en-US" dirty="0" smtClean="0">
+                <a:latin typeface="AriE"/>
+              </a:rPr>
+              <a:t>FARS provides PDF File with information regarding each column, under the filename:</a:t>
+            </a:r>
+          </a:p>
+          <a:p>
+            <a:r>
+              <a:rPr lang="en-US" dirty="0">
+                <a:latin typeface="AriE"/>
+              </a:rPr>
+              <a:t> </a:t>
+            </a:r>
+            <a:r>
+              <a:rPr lang="en-US" dirty="0" smtClean="0">
+                <a:latin typeface="AriE"/>
+              </a:rPr>
+              <a:t>   “Fatality </a:t>
+            </a:r>
+            <a:r>
+              <a:rPr lang="en-US" dirty="0">
+                <a:latin typeface="AriE"/>
+              </a:rPr>
+              <a:t>Analysis Reporting System (FARS) Analytical User’s </a:t>
+            </a:r>
+            <a:r>
+              <a:rPr lang="en-US" dirty="0" smtClean="0">
+                <a:latin typeface="AriE"/>
+              </a:rPr>
+              <a:t>Manual,</a:t>
+            </a:r>
+          </a:p>
+          <a:p>
+            <a:r>
+              <a:rPr lang="en-US" dirty="0">
+                <a:latin typeface="AriE"/>
+              </a:rPr>
+              <a:t> </a:t>
+            </a:r>
+            <a:r>
+              <a:rPr lang="en-US" dirty="0" smtClean="0">
+                <a:latin typeface="AriE"/>
+              </a:rPr>
+              <a:t>   1975-2019.PDF”</a:t>
+            </a:r>
+          </a:p>
+          <a:p>
+            <a:pPr lvl="1"/>
+            <a:r>
+              <a:rPr lang="en-US" dirty="0" smtClean="0">
+                <a:latin typeface="AriE"/>
+              </a:rPr>
+              <a:t>The file is attached in the project under csv_files folder.</a:t>
+            </a:r>
+          </a:p>
+          <a:p>
+            <a:pPr marL="285750" indent="-285750">
+              <a:buFontTx/>
+              <a:buChar char="-"/>
+            </a:pPr>
+            <a:r>
+              <a:rPr lang="en-US" dirty="0" smtClean="0">
+                <a:latin typeface="AriE"/>
+              </a:rPr>
+              <a:t>We defined a List with all irrelevant columns to be removed from The CSV data files, According to the PDF file.</a:t>
+            </a:r>
+          </a:p>
+        </p:txBody>
+      </p:sp>
+      <p:pic>
+        <p:nvPicPr>
+          <p:cNvPr id="11" name="Picture 10"/>
+          <p:cNvPicPr>
+            <a:picLocks noChangeAspect="1"/>
+          </p:cNvPicPr>
+          <p:nvPr/>
+        </p:nvPicPr>
+        <p:blipFill>
+          <a:blip r:embed="rId2"/>
+          <a:stretch>
+            <a:fillRect/>
+          </a:stretch>
+        </p:blipFill>
+        <p:spPr>
+          <a:xfrm>
+            <a:off x="4584278" y="3773382"/>
+            <a:ext cx="3082832" cy="2426812"/>
+          </a:xfrm>
+          <a:prstGeom prst="rect">
+            <a:avLst/>
+          </a:prstGeom>
+        </p:spPr>
+      </p:pic>
     </p:spTree>
     <p:extLst>
       <p:ext uri="{BB962C8B-B14F-4D97-AF65-F5344CB8AC3E}">
@@ -7462,6 +7710,13 @@
   <p:clrMapOvr>
     <a:masterClrMapping/>
   </p:clrMapOvr>
+  <p:timing>
+    <p:tnLst>
+      <p:par>
+        <p:cTn id="1" dur="indefinite" restart="never" nodeType="tmRoot"/>
+      </p:par>
+    </p:tnLst>
+  </p:timing>
 </p:sld>
 </file>
 
@@ -7532,7 +7787,7 @@
         <p:spPr>
           <a:xfrm>
             <a:off x="526082" y="1571323"/>
-            <a:ext cx="11139835" cy="923330"/>
+            <a:ext cx="7808021" cy="2308324"/>
           </a:xfrm>
           <a:prstGeom prst="rect">
             <a:avLst/>
@@ -7549,7 +7804,7 @@
               <a:buChar char="-"/>
             </a:pPr>
             <a:r>
-              <a:rPr lang="en-US" dirty="0">
+              <a:rPr lang="en-US" dirty="0" smtClean="0">
                 <a:latin typeface="AriE"/>
               </a:rPr>
               <a:t>Almost any column appears twice, First column as Text, Second time as Nominal number. </a:t>
@@ -7561,22 +7816,34 @@
               <a:buChar char="-"/>
             </a:pPr>
             <a:r>
+              <a:rPr lang="en-US" dirty="0" smtClean="0">
+                <a:latin typeface="AriE"/>
+              </a:rPr>
+              <a:t>For getting more reliable data we cleared from every column Unknown Values.</a:t>
+            </a:r>
+          </a:p>
+          <a:p>
+            <a:pPr marL="285750" indent="-285750">
+              <a:buFontTx/>
+              <a:buChar char="-"/>
+            </a:pPr>
+            <a:r>
+              <a:rPr lang="en-US" dirty="0" smtClean="0">
+                <a:latin typeface="AriE"/>
+              </a:rPr>
+              <a:t>Columns with irrelevant data for our research question</a:t>
+            </a:r>
+          </a:p>
+          <a:p>
+            <a:pPr marL="285750" indent="-285750">
+              <a:buFontTx/>
+              <a:buChar char="-"/>
+            </a:pPr>
+            <a:r>
               <a:rPr lang="en-US" dirty="0">
                 <a:latin typeface="AriE"/>
               </a:rPr>
-              <a:t>For getting more reliable data we cleared from every column </a:t>
-            </a:r>
-            <a:r>
-              <a:rPr lang="en-US" dirty="0" err="1">
-                <a:latin typeface="AriE"/>
-              </a:rPr>
-              <a:t>Unkown</a:t>
-            </a:r>
-            <a:r>
-              <a:rPr lang="en-US" dirty="0">
-                <a:latin typeface="AriE"/>
-              </a:rPr>
-              <a:t> Values.</a:t>
+              <a:t>For example:</a:t>
             </a:r>
           </a:p>
           <a:p>
@@ -7588,60 +7855,264 @@
               <a:latin typeface="AriE"/>
             </a:endParaRPr>
           </a:p>
-        </p:txBody>
-      </p:sp>
-      <p:sp>
-        <p:nvSpPr>
-          <p:cNvPr id="4" name="תיבת טקסט 3">
-            <a:extLst>
-              <a:ext uri="{FF2B5EF4-FFF2-40B4-BE49-F238E27FC236}">
-                <a16:creationId xmlns:a16="http://schemas.microsoft.com/office/drawing/2014/main" id="{1113F1C1-D887-413B-8F36-D505FD6E4F7C}"/>
-              </a:ext>
-            </a:extLst>
-          </p:cNvPr>
-          <p:cNvSpPr txBox="1"/>
+          <a:p>
+            <a:pPr marL="285750" indent="-285750">
+              <a:buFontTx/>
+              <a:buChar char="-"/>
+            </a:pPr>
+            <a:endParaRPr lang="en-US" dirty="0">
+              <a:latin typeface="AriE"/>
+            </a:endParaRPr>
+          </a:p>
+        </p:txBody>
+      </p:sp>
+      <p:pic>
+        <p:nvPicPr>
+          <p:cNvPr id="5" name="Picture 4"/>
+          <p:cNvPicPr>
+            <a:picLocks noChangeAspect="1"/>
+          </p:cNvPicPr>
           <p:nvPr/>
-        </p:nvSpPr>
-        <p:spPr>
-          <a:xfrm>
-            <a:off x="2990335" y="3682314"/>
-            <a:ext cx="4188941" cy="923330"/>
+        </p:nvPicPr>
+        <p:blipFill>
+          <a:blip r:embed="rId2"/>
+          <a:stretch>
+            <a:fillRect/>
+          </a:stretch>
+        </p:blipFill>
+        <p:spPr>
+          <a:xfrm>
+            <a:off x="8608037" y="1599843"/>
+            <a:ext cx="3105150" cy="4401737"/>
           </a:xfrm>
           <a:prstGeom prst="rect">
             <a:avLst/>
           </a:prstGeom>
-          <a:noFill/>
-        </p:spPr>
-        <p:txBody>
-          <a:bodyPr wrap="square" rtlCol="0">
-            <a:spAutoFit/>
-          </a:bodyPr>
-          <a:lstStyle/>
-          <a:p>
-            <a:pPr algn="ctr"/>
-            <a:r>
-              <a:rPr lang="he-IL" dirty="0"/>
-              <a:t>להוסיף תמונה של כל דוגמא של העמודות שמופיעות פעמיים.</a:t>
-            </a:r>
-          </a:p>
-          <a:p>
-            <a:pPr algn="ctr" rtl="1"/>
-            <a:r>
-              <a:rPr lang="he-IL" dirty="0"/>
-              <a:t>וטבלה נוספת של כל ה</a:t>
-            </a:r>
-            <a:r>
-              <a:rPr lang="en-US" dirty="0" err="1"/>
-              <a:t>Unkown</a:t>
-            </a:r>
-            <a:r>
-              <a:rPr lang="en-US" dirty="0"/>
-              <a:t> </a:t>
-            </a:r>
-            <a:endParaRPr lang="en-IL" dirty="0"/>
-          </a:p>
-        </p:txBody>
-      </p:sp>
+        </p:spPr>
+      </p:pic>
+      <p:graphicFrame>
+        <p:nvGraphicFramePr>
+          <p:cNvPr id="6" name="Table 5"/>
+          <p:cNvGraphicFramePr>
+            <a:graphicFrameLocks noGrp="1"/>
+          </p:cNvGraphicFramePr>
+          <p:nvPr>
+            <p:extLst>
+              <p:ext uri="{D42A27DB-BD31-4B8C-83A1-F6EECF244321}">
+                <p14:modId xmlns:p14="http://schemas.microsoft.com/office/powerpoint/2010/main" val="379523866"/>
+              </p:ext>
+            </p:extLst>
+          </p:nvPr>
+        </p:nvGraphicFramePr>
+        <p:xfrm>
+          <a:off x="328024" y="4807781"/>
+          <a:ext cx="8128000" cy="1193800"/>
+        </p:xfrm>
+        <a:graphic>
+          <a:graphicData uri="http://schemas.openxmlformats.org/drawingml/2006/table">
+            <a:tbl>
+              <a:tblPr rtl="1" firstRow="1" bandRow="1">
+                <a:tableStyleId>{5C22544A-7EE6-4342-B048-85BDC9FD1C3A}</a:tableStyleId>
+              </a:tblPr>
+              <a:tblGrid>
+                <a:gridCol w="3117669">
+                  <a:extLst>
+                    <a:ext uri="{9D8B030D-6E8A-4147-A177-3AD203B41FA5}">
+                      <a16:colId xmlns:a16="http://schemas.microsoft.com/office/drawing/2014/main" val="579851342"/>
+                    </a:ext>
+                  </a:extLst>
+                </a:gridCol>
+                <a:gridCol w="5010331">
+                  <a:extLst>
+                    <a:ext uri="{9D8B030D-6E8A-4147-A177-3AD203B41FA5}">
+                      <a16:colId xmlns:a16="http://schemas.microsoft.com/office/drawing/2014/main" val="4243580061"/>
+                    </a:ext>
+                  </a:extLst>
+                </a:gridCol>
+              </a:tblGrid>
+              <a:tr h="370840">
+                <a:tc>
+                  <a:txBody>
+                    <a:bodyPr/>
+                    <a:lstStyle/>
+                    <a:p>
+                      <a:pPr algn="l" rtl="1"/>
+                      <a:r>
+                        <a:rPr lang="en-US" sz="1400" dirty="0" smtClean="0"/>
+                        <a:t>Reason</a:t>
+                      </a:r>
+                      <a:r>
+                        <a:rPr lang="en-US" sz="1400" baseline="0" dirty="0" smtClean="0"/>
+                        <a:t> omitted</a:t>
+                      </a:r>
+                      <a:endParaRPr lang="he-IL" sz="1400" dirty="0"/>
+                    </a:p>
+                  </a:txBody>
+                  <a:tcPr/>
+                </a:tc>
+                <a:tc>
+                  <a:txBody>
+                    <a:bodyPr/>
+                    <a:lstStyle/>
+                    <a:p>
+                      <a:pPr algn="l" rtl="1"/>
+                      <a:r>
+                        <a:rPr lang="en-US" sz="1400" dirty="0" smtClean="0"/>
+                        <a:t>PDF</a:t>
+                      </a:r>
+                      <a:r>
+                        <a:rPr lang="en-US" sz="1400" baseline="0" dirty="0" smtClean="0"/>
+                        <a:t> Column explanation</a:t>
+                      </a:r>
+                      <a:endParaRPr lang="he-IL" sz="1400" dirty="0"/>
+                    </a:p>
+                  </a:txBody>
+                  <a:tcPr/>
+                </a:tc>
+                <a:extLst>
+                  <a:ext uri="{0D108BD9-81ED-4DB2-BD59-A6C34878D82A}">
+                    <a16:rowId xmlns:a16="http://schemas.microsoft.com/office/drawing/2014/main" val="3534645662"/>
+                  </a:ext>
+                </a:extLst>
+              </a:tr>
+              <a:tr h="177150">
+                <a:tc>
+                  <a:txBody>
+                    <a:bodyPr/>
+                    <a:lstStyle/>
+                    <a:p>
+                      <a:pPr algn="l" rtl="0"/>
+                      <a:r>
+                        <a:rPr lang="en-US" sz="1200" dirty="0" smtClean="0"/>
+                        <a:t>File consecutive number</a:t>
+                      </a:r>
+                      <a:endParaRPr lang="he-IL" sz="1200" dirty="0"/>
+                    </a:p>
+                  </a:txBody>
+                  <a:tcPr/>
+                </a:tc>
+                <a:tc>
+                  <a:txBody>
+                    <a:bodyPr/>
+                    <a:lstStyle/>
+                    <a:p>
+                      <a:pPr rtl="1"/>
+                      <a:endParaRPr lang="he-IL" dirty="0"/>
+                    </a:p>
+                  </a:txBody>
+                  <a:tcPr/>
+                </a:tc>
+                <a:extLst>
+                  <a:ext uri="{0D108BD9-81ED-4DB2-BD59-A6C34878D82A}">
+                    <a16:rowId xmlns:a16="http://schemas.microsoft.com/office/drawing/2014/main" val="4243353216"/>
+                  </a:ext>
+                </a:extLst>
+              </a:tr>
+              <a:tr h="370840">
+                <a:tc>
+                  <a:txBody>
+                    <a:bodyPr/>
+                    <a:lstStyle/>
+                    <a:p>
+                      <a:pPr marL="0" marR="0" indent="0" algn="l" defTabSz="457200" rtl="1" eaLnBrk="1" fontAlgn="auto" latinLnBrk="0" hangingPunct="1">
+                        <a:lnSpc>
+                          <a:spcPct val="100000"/>
+                        </a:lnSpc>
+                        <a:spcBef>
+                          <a:spcPts val="0"/>
+                        </a:spcBef>
+                        <a:spcAft>
+                          <a:spcPts val="0"/>
+                        </a:spcAft>
+                        <a:buClrTx/>
+                        <a:buSzTx/>
+                        <a:buFontTx/>
+                        <a:buNone/>
+                        <a:tabLst/>
+                        <a:defRPr/>
+                      </a:pPr>
+                      <a:r>
+                        <a:rPr lang="en-US" sz="1200" dirty="0" smtClean="0"/>
+                        <a:t>Our research question does not refers</a:t>
+                      </a:r>
+                      <a:r>
+                        <a:rPr lang="en-US" sz="1200" baseline="0" dirty="0" smtClean="0"/>
+                        <a:t> to forms.</a:t>
+                      </a:r>
+                      <a:endParaRPr lang="he-IL" sz="1200" dirty="0" smtClean="0"/>
+                    </a:p>
+                  </a:txBody>
+                  <a:tcPr/>
+                </a:tc>
+                <a:tc>
+                  <a:txBody>
+                    <a:bodyPr/>
+                    <a:lstStyle/>
+                    <a:p>
+                      <a:pPr rtl="1"/>
+                      <a:endParaRPr lang="he-IL" dirty="0"/>
+                    </a:p>
+                  </a:txBody>
+                  <a:tcPr/>
+                </a:tc>
+                <a:extLst>
+                  <a:ext uri="{0D108BD9-81ED-4DB2-BD59-A6C34878D82A}">
+                    <a16:rowId xmlns:a16="http://schemas.microsoft.com/office/drawing/2014/main" val="3617466950"/>
+                  </a:ext>
+                </a:extLst>
+              </a:tr>
+            </a:tbl>
+          </a:graphicData>
+        </a:graphic>
+      </p:graphicFrame>
+      <p:pic>
+        <p:nvPicPr>
+          <p:cNvPr id="7" name="Picture 6"/>
+          <p:cNvPicPr>
+            <a:picLocks noChangeAspect="1"/>
+          </p:cNvPicPr>
+          <p:nvPr/>
+        </p:nvPicPr>
+        <p:blipFill>
+          <a:blip r:embed="rId3"/>
+          <a:stretch>
+            <a:fillRect/>
+          </a:stretch>
+        </p:blipFill>
+        <p:spPr>
+          <a:xfrm>
+            <a:off x="426904" y="5253053"/>
+            <a:ext cx="4798240" cy="213450"/>
+          </a:xfrm>
+          <a:prstGeom prst="rect">
+            <a:avLst/>
+          </a:prstGeom>
+        </p:spPr>
+      </p:pic>
+      <p:pic>
+        <p:nvPicPr>
+          <p:cNvPr id="8" name="Picture 7"/>
+          <p:cNvPicPr>
+            <a:picLocks noChangeAspect="1"/>
+          </p:cNvPicPr>
+          <p:nvPr/>
+        </p:nvPicPr>
+        <p:blipFill>
+          <a:blip r:embed="rId4"/>
+          <a:stretch>
+            <a:fillRect/>
+          </a:stretch>
+        </p:blipFill>
+        <p:spPr>
+          <a:xfrm>
+            <a:off x="380278" y="5620192"/>
+            <a:ext cx="4842050" cy="246852"/>
+          </a:xfrm>
+          <a:prstGeom prst="rect">
+            <a:avLst/>
+          </a:prstGeom>
+        </p:spPr>
+      </p:pic>
     </p:spTree>
     <p:extLst>
       <p:ext uri="{BB962C8B-B14F-4D97-AF65-F5344CB8AC3E}">
@@ -7652,6 +8123,13 @@
   <p:clrMapOvr>
     <a:masterClrMapping/>
   </p:clrMapOvr>
+  <p:timing>
+    <p:tnLst>
+      <p:par>
+        <p:cTn id="1" dur="indefinite" restart="never" nodeType="tmRoot"/>
+      </p:par>
+    </p:tnLst>
+  </p:timing>
 </p:sld>
 </file>
 
@@ -7714,9 +8192,122 @@
               <a:rPr lang="he-IL" dirty="0"/>
               <a:t>מסקנות </a:t>
             </a:r>
+            <a:r>
+              <a:rPr lang="en-US" dirty="0"/>
+              <a:t/>
+            </a:r>
             <a:br>
               <a:rPr lang="en-US" dirty="0"/>
             </a:br>
+            <a:endParaRPr lang="he-IL" dirty="0"/>
+          </a:p>
+        </p:txBody>
+      </p:sp>
+      <p:sp>
+        <p:nvSpPr>
+          <p:cNvPr id="3" name="Title 1"/>
+          <p:cNvSpPr txBox="1">
+            <a:spLocks/>
+          </p:cNvSpPr>
+          <p:nvPr/>
+        </p:nvSpPr>
+        <p:spPr>
+          <a:xfrm>
+            <a:off x="770875" y="432486"/>
+            <a:ext cx="8825658" cy="929723"/>
+          </a:xfrm>
+          <a:prstGeom prst="rect">
+            <a:avLst/>
+          </a:prstGeom>
+        </p:spPr>
+        <p:txBody>
+          <a:bodyPr vert="horz" lIns="91440" tIns="45720" rIns="91440" bIns="45720" rtlCol="0" anchor="b">
+            <a:noAutofit/>
+          </a:bodyPr>
+          <a:lstStyle>
+            <a:lvl1pPr algn="l" defTabSz="457200" rtl="1" eaLnBrk="1" latinLnBrk="0" hangingPunct="1">
+              <a:spcBef>
+                <a:spcPct val="0"/>
+              </a:spcBef>
+              <a:buNone/>
+              <a:defRPr sz="7200" b="0" i="0" kern="1200">
+                <a:solidFill>
+                  <a:schemeClr val="tx2"/>
+                </a:solidFill>
+                <a:latin typeface="+mj-lt"/>
+                <a:ea typeface="+mj-ea"/>
+                <a:cs typeface="+mj-cs"/>
+              </a:defRPr>
+            </a:lvl1pPr>
+            <a:lvl2pPr rtl="1" eaLnBrk="1" hangingPunct="1">
+              <a:defRPr>
+                <a:solidFill>
+                  <a:schemeClr val="tx2"/>
+                </a:solidFill>
+              </a:defRPr>
+            </a:lvl2pPr>
+            <a:lvl3pPr rtl="1" eaLnBrk="1" hangingPunct="1">
+              <a:defRPr>
+                <a:solidFill>
+                  <a:schemeClr val="tx2"/>
+                </a:solidFill>
+              </a:defRPr>
+            </a:lvl3pPr>
+            <a:lvl4pPr rtl="1" eaLnBrk="1" hangingPunct="1">
+              <a:defRPr>
+                <a:solidFill>
+                  <a:schemeClr val="tx2"/>
+                </a:solidFill>
+              </a:defRPr>
+            </a:lvl4pPr>
+            <a:lvl5pPr rtl="1" eaLnBrk="1" hangingPunct="1">
+              <a:defRPr>
+                <a:solidFill>
+                  <a:schemeClr val="tx2"/>
+                </a:solidFill>
+              </a:defRPr>
+            </a:lvl5pPr>
+            <a:lvl6pPr rtl="1" eaLnBrk="1" hangingPunct="1">
+              <a:defRPr>
+                <a:solidFill>
+                  <a:schemeClr val="tx2"/>
+                </a:solidFill>
+              </a:defRPr>
+            </a:lvl6pPr>
+            <a:lvl7pPr rtl="1" eaLnBrk="1" hangingPunct="1">
+              <a:defRPr>
+                <a:solidFill>
+                  <a:schemeClr val="tx2"/>
+                </a:solidFill>
+              </a:defRPr>
+            </a:lvl7pPr>
+            <a:lvl8pPr rtl="1" eaLnBrk="1" hangingPunct="1">
+              <a:defRPr>
+                <a:solidFill>
+                  <a:schemeClr val="tx2"/>
+                </a:solidFill>
+              </a:defRPr>
+            </a:lvl8pPr>
+            <a:lvl9pPr rtl="1" eaLnBrk="1" hangingPunct="1">
+              <a:defRPr>
+                <a:solidFill>
+                  <a:schemeClr val="tx2"/>
+                </a:solidFill>
+              </a:defRPr>
+            </a:lvl9pPr>
+          </a:lstStyle>
+          <a:p>
+            <a:r>
+              <a:rPr lang="en-US" sz="5400" b="1" dirty="0" smtClean="0">
+                <a:solidFill>
+                  <a:schemeClr val="tx1"/>
+                </a:solidFill>
+                <a:latin typeface="+mn-lt"/>
+                <a:ea typeface="+mn-ea"/>
+                <a:cs typeface="+mn-cs"/>
+              </a:rPr>
+              <a:t>Graphs </a:t>
+            </a:r>
             <a:endParaRPr lang="he-IL" dirty="0"/>
           </a:p>
         </p:txBody>
@@ -7731,6 +8322,13 @@
   <p:clrMapOvr>
     <a:masterClrMapping/>
   </p:clrMapOvr>
+  <p:timing>
+    <p:tnLst>
+      <p:par>
+        <p:cTn id="1" dur="indefinite" restart="never" nodeType="tmRoot"/>
+      </p:par>
+    </p:tnLst>
+  </p:timing>
 </p:sld>
 </file>
 

</xml_diff>

<commit_message>
Added Prediction function inside machine_learning.py
</commit_message>
<xml_diff>
--- a/documents/Car Accidents Project.pptx
+++ b/documents/Car Accidents Project.pptx
@@ -315,7 +315,7 @@
           <a:p>
             <a:fld id="{4AAD347D-5ACD-4C99-B74B-A9C85AD731AF}" type="datetimeFigureOut">
               <a:rPr lang="en-US" dirty="0"/>
-              <a:t>6/19/2021</a:t>
+              <a:t>6/23/2021</a:t>
             </a:fld>
             <a:endParaRPr lang="en-US" dirty="0"/>
           </a:p>
@@ -585,7 +585,7 @@
           <a:p>
             <a:fld id="{4509A250-FF31-4206-8172-F9D3106AACB1}" type="datetimeFigureOut">
               <a:rPr lang="en-US" dirty="0"/>
-              <a:t>6/19/2021</a:t>
+              <a:t>6/23/2021</a:t>
             </a:fld>
             <a:endParaRPr lang="en-US" dirty="0"/>
           </a:p>
@@ -774,7 +774,7 @@
           <a:p>
             <a:fld id="{4509A250-FF31-4206-8172-F9D3106AACB1}" type="datetimeFigureOut">
               <a:rPr lang="en-US" dirty="0"/>
-              <a:t>6/19/2021</a:t>
+              <a:t>6/23/2021</a:t>
             </a:fld>
             <a:endParaRPr lang="en-US" dirty="0"/>
           </a:p>
@@ -1042,7 +1042,7 @@
           <a:p>
             <a:fld id="{4509A250-FF31-4206-8172-F9D3106AACB1}" type="datetimeFigureOut">
               <a:rPr lang="en-US" dirty="0"/>
-              <a:t>6/19/2021</a:t>
+              <a:t>6/23/2021</a:t>
             </a:fld>
             <a:endParaRPr lang="en-US" dirty="0"/>
           </a:p>
@@ -1378,7 +1378,7 @@
           <a:p>
             <a:fld id="{4509A250-FF31-4206-8172-F9D3106AACB1}" type="datetimeFigureOut">
               <a:rPr lang="en-US" dirty="0"/>
-              <a:t>6/19/2021</a:t>
+              <a:t>6/23/2021</a:t>
             </a:fld>
             <a:endParaRPr lang="en-US" dirty="0"/>
           </a:p>
@@ -1996,7 +1996,7 @@
           <a:p>
             <a:fld id="{4509A250-FF31-4206-8172-F9D3106AACB1}" type="datetimeFigureOut">
               <a:rPr lang="en-US" dirty="0"/>
-              <a:t>6/19/2021</a:t>
+              <a:t>6/23/2021</a:t>
             </a:fld>
             <a:endParaRPr lang="en-US" dirty="0"/>
           </a:p>
@@ -2851,7 +2851,7 @@
           <a:p>
             <a:fld id="{4509A250-FF31-4206-8172-F9D3106AACB1}" type="datetimeFigureOut">
               <a:rPr lang="en-US" dirty="0"/>
-              <a:t>6/19/2021</a:t>
+              <a:t>6/23/2021</a:t>
             </a:fld>
             <a:endParaRPr lang="en-US" dirty="0"/>
           </a:p>
@@ -3016,7 +3016,7 @@
           <a:p>
             <a:fld id="{4509A250-FF31-4206-8172-F9D3106AACB1}" type="datetimeFigureOut">
               <a:rPr lang="en-US" dirty="0"/>
-              <a:t>6/19/2021</a:t>
+              <a:t>6/23/2021</a:t>
             </a:fld>
             <a:endParaRPr lang="en-US" dirty="0"/>
           </a:p>
@@ -3191,7 +3191,7 @@
           <a:p>
             <a:fld id="{4509A250-FF31-4206-8172-F9D3106AACB1}" type="datetimeFigureOut">
               <a:rPr lang="en-US" dirty="0"/>
-              <a:t>6/19/2021</a:t>
+              <a:t>6/23/2021</a:t>
             </a:fld>
             <a:endParaRPr lang="en-US" dirty="0"/>
           </a:p>
@@ -3356,7 +3356,7 @@
           <a:p>
             <a:fld id="{4509A250-FF31-4206-8172-F9D3106AACB1}" type="datetimeFigureOut">
               <a:rPr lang="en-US" dirty="0"/>
-              <a:t>6/19/2021</a:t>
+              <a:t>6/23/2021</a:t>
             </a:fld>
             <a:endParaRPr lang="en-US" dirty="0"/>
           </a:p>
@@ -3598,7 +3598,7 @@
           <a:p>
             <a:fld id="{9796027F-7875-4030-9381-8BD8C4F21935}" type="datetimeFigureOut">
               <a:rPr lang="en-US" dirty="0"/>
-              <a:t>6/19/2021</a:t>
+              <a:t>6/23/2021</a:t>
             </a:fld>
             <a:endParaRPr lang="en-US" dirty="0"/>
           </a:p>
@@ -3885,7 +3885,7 @@
           <a:p>
             <a:fld id="{9796027F-7875-4030-9381-8BD8C4F21935}" type="datetimeFigureOut">
               <a:rPr lang="en-US" dirty="0"/>
-              <a:t>6/19/2021</a:t>
+              <a:t>6/23/2021</a:t>
             </a:fld>
             <a:endParaRPr lang="en-US" dirty="0"/>
           </a:p>
@@ -4324,7 +4324,7 @@
           <a:p>
             <a:fld id="{9796027F-7875-4030-9381-8BD8C4F21935}" type="datetimeFigureOut">
               <a:rPr lang="en-US" dirty="0"/>
-              <a:t>6/19/2021</a:t>
+              <a:t>6/23/2021</a:t>
             </a:fld>
             <a:endParaRPr lang="en-US" dirty="0"/>
           </a:p>
@@ -4437,7 +4437,7 @@
           <a:p>
             <a:fld id="{4509A250-FF31-4206-8172-F9D3106AACB1}" type="datetimeFigureOut">
               <a:rPr lang="en-US" dirty="0"/>
-              <a:t>6/19/2021</a:t>
+              <a:t>6/23/2021</a:t>
             </a:fld>
             <a:endParaRPr lang="en-US" dirty="0"/>
           </a:p>
@@ -4527,7 +4527,7 @@
           <a:p>
             <a:fld id="{4509A250-FF31-4206-8172-F9D3106AACB1}" type="datetimeFigureOut">
               <a:rPr lang="en-US" dirty="0"/>
-              <a:t>6/19/2021</a:t>
+              <a:t>6/23/2021</a:t>
             </a:fld>
             <a:endParaRPr lang="en-US" dirty="0"/>
           </a:p>
@@ -4801,7 +4801,7 @@
           <a:p>
             <a:fld id="{4509A250-FF31-4206-8172-F9D3106AACB1}" type="datetimeFigureOut">
               <a:rPr lang="en-US" dirty="0"/>
-              <a:t>6/19/2021</a:t>
+              <a:t>6/23/2021</a:t>
             </a:fld>
             <a:endParaRPr lang="en-US" dirty="0"/>
           </a:p>
@@ -5071,7 +5071,7 @@
           <a:p>
             <a:fld id="{4509A250-FF31-4206-8172-F9D3106AACB1}" type="datetimeFigureOut">
               <a:rPr lang="en-US" dirty="0"/>
-              <a:t>6/19/2021</a:t>
+              <a:t>6/23/2021</a:t>
             </a:fld>
             <a:endParaRPr lang="en-US" dirty="0"/>
           </a:p>
@@ -5495,7 +5495,7 @@
           <a:p>
             <a:fld id="{4AAD347D-5ACD-4C99-B74B-A9C85AD731AF}" type="datetimeFigureOut">
               <a:rPr lang="en-US" dirty="0"/>
-              <a:t>6/19/2021</a:t>
+              <a:t>6/23/2021</a:t>
             </a:fld>
             <a:endParaRPr lang="en-US" dirty="0"/>
           </a:p>
@@ -7336,25 +7336,7 @@
               <a:rPr lang="en-US" dirty="0">
                 <a:latin typeface="AriE"/>
               </a:rPr>
-              <a:t>There</a:t>
-            </a:r>
-            <a:r>
-              <a:rPr lang="en-US" dirty="0">
-                <a:latin typeface="AriE"/>
-              </a:rPr>
-              <a:t> is a lot of API options, and we chose to Get </a:t>
-            </a:r>
-            <a:r>
-              <a:rPr lang="en-US" dirty="0">
-                <a:latin typeface="AriE"/>
-              </a:rPr>
-              <a:t>FARS Data By </a:t>
-            </a:r>
-            <a:r>
-              <a:rPr lang="en-US" dirty="0">
-                <a:latin typeface="AriE"/>
-              </a:rPr>
-              <a:t>Year with the richest variety of information. </a:t>
+              <a:t>There is a lot of API options, and we chose to Get FARS Data By Year with the richest variety of information. </a:t>
             </a:r>
           </a:p>
           <a:p>
@@ -7486,11 +7468,11 @@
   <p:clrMapOvr>
     <a:masterClrMapping/>
   </p:clrMapOvr>
-  <mc:AlternateContent xmlns:mc="http://schemas.openxmlformats.org/markup-compatibility/2006">
-    <mc:Choice xmlns:p14="http://schemas.microsoft.com/office/powerpoint/2010/main" Requires="p14">
+  <mc:AlternateContent xmlns:mc="http://schemas.openxmlformats.org/markup-compatibility/2006" xmlns:p14="http://schemas.microsoft.com/office/powerpoint/2010/main">
+    <mc:Choice Requires="p14">
       <p:transition spd="slow" p14:dur="2000"/>
     </mc:Choice>
-    <mc:Fallback>
+    <mc:Fallback xmlns="">
       <p:transition spd="slow"/>
     </mc:Fallback>
   </mc:AlternateContent>
@@ -8351,7 +8333,116 @@
       </p:grpSpPr>
       <p:sp>
         <p:nvSpPr>
-          <p:cNvPr id="2" name="Title 1"/>
+          <p:cNvPr id="3" name="Title 1"/>
+          <p:cNvSpPr txBox="1">
+            <a:spLocks/>
+          </p:cNvSpPr>
+          <p:nvPr/>
+        </p:nvSpPr>
+        <p:spPr>
+          <a:xfrm>
+            <a:off x="770875" y="432486"/>
+            <a:ext cx="8825658" cy="929723"/>
+          </a:xfrm>
+          <a:prstGeom prst="rect">
+            <a:avLst/>
+          </a:prstGeom>
+        </p:spPr>
+        <p:txBody>
+          <a:bodyPr vert="horz" lIns="91440" tIns="45720" rIns="91440" bIns="45720" rtlCol="0" anchor="b">
+            <a:noAutofit/>
+          </a:bodyPr>
+          <a:lstStyle>
+            <a:lvl1pPr algn="l" defTabSz="457200" rtl="1" eaLnBrk="1" latinLnBrk="0" hangingPunct="1">
+              <a:spcBef>
+                <a:spcPct val="0"/>
+              </a:spcBef>
+              <a:buNone/>
+              <a:defRPr sz="7200" b="0" i="0" kern="1200">
+                <a:solidFill>
+                  <a:schemeClr val="tx2"/>
+                </a:solidFill>
+                <a:latin typeface="+mj-lt"/>
+                <a:ea typeface="+mj-ea"/>
+                <a:cs typeface="+mj-cs"/>
+              </a:defRPr>
+            </a:lvl1pPr>
+            <a:lvl2pPr rtl="1" eaLnBrk="1" hangingPunct="1">
+              <a:defRPr>
+                <a:solidFill>
+                  <a:schemeClr val="tx2"/>
+                </a:solidFill>
+              </a:defRPr>
+            </a:lvl2pPr>
+            <a:lvl3pPr rtl="1" eaLnBrk="1" hangingPunct="1">
+              <a:defRPr>
+                <a:solidFill>
+                  <a:schemeClr val="tx2"/>
+                </a:solidFill>
+              </a:defRPr>
+            </a:lvl3pPr>
+            <a:lvl4pPr rtl="1" eaLnBrk="1" hangingPunct="1">
+              <a:defRPr>
+                <a:solidFill>
+                  <a:schemeClr val="tx2"/>
+                </a:solidFill>
+              </a:defRPr>
+            </a:lvl4pPr>
+            <a:lvl5pPr rtl="1" eaLnBrk="1" hangingPunct="1">
+              <a:defRPr>
+                <a:solidFill>
+                  <a:schemeClr val="tx2"/>
+                </a:solidFill>
+              </a:defRPr>
+            </a:lvl5pPr>
+            <a:lvl6pPr rtl="1" eaLnBrk="1" hangingPunct="1">
+              <a:defRPr>
+                <a:solidFill>
+                  <a:schemeClr val="tx2"/>
+                </a:solidFill>
+              </a:defRPr>
+            </a:lvl6pPr>
+            <a:lvl7pPr rtl="1" eaLnBrk="1" hangingPunct="1">
+              <a:defRPr>
+                <a:solidFill>
+                  <a:schemeClr val="tx2"/>
+                </a:solidFill>
+              </a:defRPr>
+            </a:lvl7pPr>
+            <a:lvl8pPr rtl="1" eaLnBrk="1" hangingPunct="1">
+              <a:defRPr>
+                <a:solidFill>
+                  <a:schemeClr val="tx2"/>
+                </a:solidFill>
+              </a:defRPr>
+            </a:lvl8pPr>
+            <a:lvl9pPr rtl="1" eaLnBrk="1" hangingPunct="1">
+              <a:defRPr>
+                <a:solidFill>
+                  <a:schemeClr val="tx2"/>
+                </a:solidFill>
+              </a:defRPr>
+            </a:lvl9pPr>
+          </a:lstStyle>
+          <a:p>
+            <a:r>
+              <a:rPr lang="en-US" sz="5400" b="1" dirty="0" smtClean="0">
+                <a:solidFill>
+                  <a:schemeClr val="tx1"/>
+                </a:solidFill>
+                <a:latin typeface="+mn-lt"/>
+                <a:ea typeface="+mn-ea"/>
+                <a:cs typeface="+mn-cs"/>
+              </a:rPr>
+              <a:t>Machine Learning</a:t>
+            </a:r>
+            <a:endParaRPr lang="he-IL" dirty="0"/>
+          </a:p>
+        </p:txBody>
+      </p:sp>
+      <p:sp>
+        <p:nvSpPr>
+          <p:cNvPr id="4" name="Title 3"/>
           <p:cNvSpPr>
             <a:spLocks noGrp="1"/>
           </p:cNvSpPr>
@@ -8359,34 +8450,12 @@
             <p:ph type="ctrTitle"/>
           </p:nvPr>
         </p:nvSpPr>
-        <p:spPr>
-          <a:xfrm>
-            <a:off x="1164123" y="911535"/>
-            <a:ext cx="8825658" cy="3329581"/>
-          </a:xfrm>
-        </p:spPr>
+        <p:spPr/>
         <p:txBody>
           <a:bodyPr/>
           <a:lstStyle/>
           <a:p>
-            <a:r>
-              <a:rPr lang="he-IL" dirty="0"/>
-              <a:t>למידת מכונה</a:t>
-            </a:r>
-            <a:br>
-              <a:rPr lang="he-IL" dirty="0"/>
-            </a:br>
-            <a:r>
-              <a:rPr lang="he-IL" dirty="0"/>
-              <a:t>מסקנות </a:t>
-            </a:r>
-            <a:br>
-              <a:rPr lang="he-IL" dirty="0"/>
-            </a:br>
-            <a:r>
-              <a:rPr lang="he-IL" dirty="0"/>
-              <a:t>ואיך לבצע</a:t>
-            </a:r>
+            <a:endParaRPr lang="he-IL"/>
           </a:p>
         </p:txBody>
       </p:sp>

</xml_diff>